<commit_message>
Fix discussion on merkle proofs
</commit_message>
<xml_diff>
--- a/figures/background/trie/tree_with_merkle_proof.pptx
+++ b/figures/background/trie/tree_with_merkle_proof.pptx
@@ -6,6 +6,8 @@
   </p:sldMasterIdLst>
   <p:sldIdLst>
     <p:sldId id="257" r:id="rId2"/>
+    <p:sldId id="259" r:id="rId3"/>
+    <p:sldId id="260" r:id="rId4"/>
   </p:sldIdLst>
   <p:sldSz cx="11887200" cy="3932238"/>
   <p:notesSz cx="6858000" cy="9144000"/>
@@ -243,7 +245,7 @@
           <a:p>
             <a:fld id="{494E2E67-9B52-574C-8989-121C96AB5853}" type="datetimeFigureOut">
               <a:rPr lang="en-US" smtClean="0"/>
-              <a:t>4/23/19</a:t>
+              <a:t>5/6/19</a:t>
             </a:fld>
             <a:endParaRPr lang="en-US"/>
           </a:p>
@@ -408,7 +410,7 @@
           <a:p>
             <a:fld id="{494E2E67-9B52-574C-8989-121C96AB5853}" type="datetimeFigureOut">
               <a:rPr lang="en-US" smtClean="0"/>
-              <a:t>4/23/19</a:t>
+              <a:t>5/6/19</a:t>
             </a:fld>
             <a:endParaRPr lang="en-US"/>
           </a:p>
@@ -583,7 +585,7 @@
           <a:p>
             <a:fld id="{494E2E67-9B52-574C-8989-121C96AB5853}" type="datetimeFigureOut">
               <a:rPr lang="en-US" smtClean="0"/>
-              <a:t>4/23/19</a:t>
+              <a:t>5/6/19</a:t>
             </a:fld>
             <a:endParaRPr lang="en-US"/>
           </a:p>
@@ -748,7 +750,7 @@
           <a:p>
             <a:fld id="{494E2E67-9B52-574C-8989-121C96AB5853}" type="datetimeFigureOut">
               <a:rPr lang="en-US" smtClean="0"/>
-              <a:t>4/23/19</a:t>
+              <a:t>5/6/19</a:t>
             </a:fld>
             <a:endParaRPr lang="en-US"/>
           </a:p>
@@ -989,7 +991,7 @@
           <a:p>
             <a:fld id="{494E2E67-9B52-574C-8989-121C96AB5853}" type="datetimeFigureOut">
               <a:rPr lang="en-US" smtClean="0"/>
-              <a:t>4/23/19</a:t>
+              <a:t>5/6/19</a:t>
             </a:fld>
             <a:endParaRPr lang="en-US"/>
           </a:p>
@@ -1216,7 +1218,7 @@
           <a:p>
             <a:fld id="{494E2E67-9B52-574C-8989-121C96AB5853}" type="datetimeFigureOut">
               <a:rPr lang="en-US" smtClean="0"/>
-              <a:t>4/23/19</a:t>
+              <a:t>5/6/19</a:t>
             </a:fld>
             <a:endParaRPr lang="en-US"/>
           </a:p>
@@ -1578,7 +1580,7 @@
           <a:p>
             <a:fld id="{494E2E67-9B52-574C-8989-121C96AB5853}" type="datetimeFigureOut">
               <a:rPr lang="en-US" smtClean="0"/>
-              <a:t>4/23/19</a:t>
+              <a:t>5/6/19</a:t>
             </a:fld>
             <a:endParaRPr lang="en-US"/>
           </a:p>
@@ -1691,7 +1693,7 @@
           <a:p>
             <a:fld id="{494E2E67-9B52-574C-8989-121C96AB5853}" type="datetimeFigureOut">
               <a:rPr lang="en-US" smtClean="0"/>
-              <a:t>4/23/19</a:t>
+              <a:t>5/6/19</a:t>
             </a:fld>
             <a:endParaRPr lang="en-US"/>
           </a:p>
@@ -1781,7 +1783,7 @@
           <a:p>
             <a:fld id="{494E2E67-9B52-574C-8989-121C96AB5853}" type="datetimeFigureOut">
               <a:rPr lang="en-US" smtClean="0"/>
-              <a:t>4/23/19</a:t>
+              <a:t>5/6/19</a:t>
             </a:fld>
             <a:endParaRPr lang="en-US"/>
           </a:p>
@@ -2053,7 +2055,7 @@
           <a:p>
             <a:fld id="{494E2E67-9B52-574C-8989-121C96AB5853}" type="datetimeFigureOut">
               <a:rPr lang="en-US" smtClean="0"/>
-              <a:t>4/23/19</a:t>
+              <a:t>5/6/19</a:t>
             </a:fld>
             <a:endParaRPr lang="en-US"/>
           </a:p>
@@ -2305,7 +2307,7 @@
           <a:p>
             <a:fld id="{494E2E67-9B52-574C-8989-121C96AB5853}" type="datetimeFigureOut">
               <a:rPr lang="en-US" smtClean="0"/>
-              <a:t>4/23/19</a:t>
+              <a:t>5/6/19</a:t>
             </a:fld>
             <a:endParaRPr lang="en-US"/>
           </a:p>
@@ -2513,7 +2515,7 @@
           <a:p>
             <a:fld id="{494E2E67-9B52-574C-8989-121C96AB5853}" type="datetimeFigureOut">
               <a:rPr lang="en-US" smtClean="0"/>
-              <a:t>4/23/19</a:t>
+              <a:t>5/6/19</a:t>
             </a:fld>
             <a:endParaRPr lang="en-US"/>
           </a:p>
@@ -2933,7 +2935,7 @@
             <a:avLst/>
           </a:prstGeom>
           <a:solidFill>
-            <a:schemeClr val="accent6"/>
+            <a:schemeClr val="accent1"/>
           </a:solidFill>
         </p:spPr>
         <p:style>
@@ -3078,7 +3080,7 @@
             <a:avLst/>
           </a:prstGeom>
           <a:solidFill>
-            <a:schemeClr val="accent6"/>
+            <a:schemeClr val="accent1"/>
           </a:solidFill>
         </p:spPr>
         <p:style>
@@ -3239,7 +3241,7 @@
             <a:avLst/>
           </a:prstGeom>
           <a:solidFill>
-            <a:schemeClr val="accent6"/>
+            <a:schemeClr val="accent1"/>
           </a:solidFill>
         </p:spPr>
         <p:style>
@@ -3528,6 +3530,3060 @@
     <p:extLst>
       <p:ext uri="{BB962C8B-B14F-4D97-AF65-F5344CB8AC3E}">
         <p14:creationId xmlns:p14="http://schemas.microsoft.com/office/powerpoint/2010/main" val="1821741640"/>
+      </p:ext>
+    </p:extLst>
+  </p:cSld>
+  <p:clrMapOvr>
+    <a:masterClrMapping/>
+  </p:clrMapOvr>
+</p:sld>
+</file>
+
+<file path=ppt/slides/slide2.xml><?xml version="1.0" encoding="utf-8"?>
+<p:sld xmlns:a="http://schemas.openxmlformats.org/drawingml/2006/main" xmlns:r="http://schemas.openxmlformats.org/officeDocument/2006/relationships" xmlns:p="http://schemas.openxmlformats.org/presentationml/2006/main">
+  <p:cSld>
+    <p:spTree>
+      <p:nvGrpSpPr>
+        <p:cNvPr id="1" name=""/>
+        <p:cNvGrpSpPr/>
+        <p:nvPr/>
+      </p:nvGrpSpPr>
+      <p:grpSpPr>
+        <a:xfrm>
+          <a:off x="0" y="0"/>
+          <a:ext cx="0" cy="0"/>
+          <a:chOff x="0" y="0"/>
+          <a:chExt cx="0" cy="0"/>
+        </a:xfrm>
+      </p:grpSpPr>
+      <p:sp>
+        <p:nvSpPr>
+          <p:cNvPr id="5" name="Rounded Rectangle 4"/>
+          <p:cNvSpPr/>
+          <p:nvPr/>
+        </p:nvSpPr>
+        <p:spPr>
+          <a:xfrm>
+            <a:off x="3509819" y="330920"/>
+            <a:ext cx="4957011" cy="713184"/>
+          </a:xfrm>
+          <a:prstGeom prst="roundRect">
+            <a:avLst/>
+          </a:prstGeom>
+          <a:solidFill>
+            <a:schemeClr val="accent1"/>
+          </a:solidFill>
+        </p:spPr>
+        <p:style>
+          <a:lnRef idx="2">
+            <a:schemeClr val="accent1">
+              <a:shade val="50000"/>
+            </a:schemeClr>
+          </a:lnRef>
+          <a:fillRef idx="1">
+            <a:schemeClr val="accent1"/>
+          </a:fillRef>
+          <a:effectRef idx="0">
+            <a:schemeClr val="accent1"/>
+          </a:effectRef>
+          <a:fontRef idx="minor">
+            <a:schemeClr val="lt1"/>
+          </a:fontRef>
+        </p:style>
+        <p:txBody>
+          <a:bodyPr rot="0" spcFirstLastPara="0" vertOverflow="overflow" horzOverflow="overflow" vert="horz" wrap="square" lIns="91440" tIns="45720" rIns="91440" bIns="45720" numCol="1" spcCol="0" rtlCol="0" fromWordArt="0" anchor="ctr" anchorCtr="0" forceAA="0" compatLnSpc="1">
+            <a:prstTxWarp prst="textNoShape">
+              <a:avLst/>
+            </a:prstTxWarp>
+            <a:noAutofit/>
+          </a:bodyPr>
+          <a:lstStyle/>
+          <a:p>
+            <a:pPr algn="ctr"/>
+            <a:r>
+              <a:rPr lang="en-US" dirty="0"/>
+              <a:t>Root Node</a:t>
+            </a:r>
+            <a:r>
+              <a:rPr lang="en-US"/>
+              <a:t>. </a:t>
+            </a:r>
+          </a:p>
+          <a:p>
+            <a:pPr algn="ctr"/>
+            <a:r>
+              <a:rPr lang="en-US" dirty="0"/>
+              <a:t>Children: [0x3244</a:t>
+            </a:r>
+            <a:r>
+              <a:rPr lang="mr-IN" dirty="0"/>
+              <a:t>…</a:t>
+            </a:r>
+            <a:r>
+              <a:rPr lang="en-US" dirty="0"/>
+              <a:t>f31e, 0x5484</a:t>
+            </a:r>
+            <a:r>
+              <a:rPr lang="mr-IN" dirty="0"/>
+              <a:t>…</a:t>
+            </a:r>
+            <a:r>
+              <a:rPr lang="en-US" dirty="0"/>
+              <a:t>20f1]</a:t>
+            </a:r>
+          </a:p>
+        </p:txBody>
+      </p:sp>
+      <p:sp>
+        <p:nvSpPr>
+          <p:cNvPr id="6" name="Rounded Rectangle 5"/>
+          <p:cNvSpPr/>
+          <p:nvPr/>
+        </p:nvSpPr>
+        <p:spPr>
+          <a:xfrm>
+            <a:off x="1820577" y="1653555"/>
+            <a:ext cx="3378468" cy="727792"/>
+          </a:xfrm>
+          <a:prstGeom prst="roundRect">
+            <a:avLst/>
+          </a:prstGeom>
+          <a:solidFill>
+            <a:schemeClr val="accent2">
+              <a:lumMod val="75000"/>
+            </a:schemeClr>
+          </a:solidFill>
+        </p:spPr>
+        <p:style>
+          <a:lnRef idx="2">
+            <a:schemeClr val="accent1">
+              <a:shade val="50000"/>
+            </a:schemeClr>
+          </a:lnRef>
+          <a:fillRef idx="1">
+            <a:schemeClr val="accent1"/>
+          </a:fillRef>
+          <a:effectRef idx="0">
+            <a:schemeClr val="accent1"/>
+          </a:effectRef>
+          <a:fontRef idx="minor">
+            <a:schemeClr val="lt1"/>
+          </a:fontRef>
+        </p:style>
+        <p:txBody>
+          <a:bodyPr rot="0" spcFirstLastPara="0" vertOverflow="overflow" horzOverflow="overflow" vert="horz" wrap="square" lIns="91440" tIns="45720" rIns="91440" bIns="45720" numCol="1" spcCol="0" rtlCol="0" fromWordArt="0" anchor="ctr" anchorCtr="0" forceAA="0" compatLnSpc="1">
+            <a:prstTxWarp prst="textNoShape">
+              <a:avLst/>
+            </a:prstTxWarp>
+            <a:noAutofit/>
+          </a:bodyPr>
+          <a:lstStyle/>
+          <a:p>
+            <a:pPr algn="ctr"/>
+            <a:r>
+              <a:rPr lang="en-US" dirty="0"/>
+              <a:t>Non-leaf Node. Children: [0xf45e</a:t>
+            </a:r>
+            <a:r>
+              <a:rPr lang="mr-IN" dirty="0"/>
+              <a:t>…</a:t>
+            </a:r>
+            <a:r>
+              <a:rPr lang="en-US" dirty="0"/>
+              <a:t>3789, 0xa38c</a:t>
+            </a:r>
+            <a:r>
+              <a:rPr lang="mr-IN" dirty="0"/>
+              <a:t>…</a:t>
+            </a:r>
+            <a:r>
+              <a:rPr lang="en-US" dirty="0"/>
+              <a:t>f32b]</a:t>
+            </a:r>
+          </a:p>
+        </p:txBody>
+      </p:sp>
+      <p:sp>
+        <p:nvSpPr>
+          <p:cNvPr id="7" name="Rounded Rectangle 6"/>
+          <p:cNvSpPr/>
+          <p:nvPr/>
+        </p:nvSpPr>
+        <p:spPr>
+          <a:xfrm>
+            <a:off x="6777588" y="1652957"/>
+            <a:ext cx="3378468" cy="727792"/>
+          </a:xfrm>
+          <a:prstGeom prst="roundRect">
+            <a:avLst/>
+          </a:prstGeom>
+          <a:solidFill>
+            <a:schemeClr val="accent1"/>
+          </a:solidFill>
+        </p:spPr>
+        <p:style>
+          <a:lnRef idx="2">
+            <a:schemeClr val="accent1">
+              <a:shade val="50000"/>
+            </a:schemeClr>
+          </a:lnRef>
+          <a:fillRef idx="1">
+            <a:schemeClr val="accent1"/>
+          </a:fillRef>
+          <a:effectRef idx="0">
+            <a:schemeClr val="accent1"/>
+          </a:effectRef>
+          <a:fontRef idx="minor">
+            <a:schemeClr val="lt1"/>
+          </a:fontRef>
+        </p:style>
+        <p:txBody>
+          <a:bodyPr rot="0" spcFirstLastPara="0" vertOverflow="overflow" horzOverflow="overflow" vert="horz" wrap="square" lIns="91440" tIns="45720" rIns="91440" bIns="45720" numCol="1" spcCol="0" rtlCol="0" fromWordArt="0" anchor="ctr" anchorCtr="0" forceAA="0" compatLnSpc="1">
+            <a:prstTxWarp prst="textNoShape">
+              <a:avLst/>
+            </a:prstTxWarp>
+            <a:noAutofit/>
+          </a:bodyPr>
+          <a:lstStyle/>
+          <a:p>
+            <a:pPr algn="ctr"/>
+            <a:r>
+              <a:rPr lang="en-US" dirty="0"/>
+              <a:t>Non-leaf Node. Children: [0x78b4...4bc7, 0x983b</a:t>
+            </a:r>
+            <a:r>
+              <a:rPr lang="mr-IN" dirty="0"/>
+              <a:t>…</a:t>
+            </a:r>
+            <a:r>
+              <a:rPr lang="en-US" dirty="0"/>
+              <a:t>ff3e]</a:t>
+            </a:r>
+          </a:p>
+        </p:txBody>
+      </p:sp>
+      <p:sp>
+        <p:nvSpPr>
+          <p:cNvPr id="8" name="Rounded Rectangle 7"/>
+          <p:cNvSpPr/>
+          <p:nvPr/>
+        </p:nvSpPr>
+        <p:spPr>
+          <a:xfrm>
+            <a:off x="545235" y="2989603"/>
+            <a:ext cx="1992429" cy="580326"/>
+          </a:xfrm>
+          <a:prstGeom prst="roundRect">
+            <a:avLst/>
+          </a:prstGeom>
+          <a:solidFill>
+            <a:schemeClr val="accent1"/>
+          </a:solidFill>
+        </p:spPr>
+        <p:style>
+          <a:lnRef idx="2">
+            <a:schemeClr val="accent1">
+              <a:shade val="50000"/>
+            </a:schemeClr>
+          </a:lnRef>
+          <a:fillRef idx="1">
+            <a:schemeClr val="accent1"/>
+          </a:fillRef>
+          <a:effectRef idx="0">
+            <a:schemeClr val="accent1"/>
+          </a:effectRef>
+          <a:fontRef idx="minor">
+            <a:schemeClr val="lt1"/>
+          </a:fontRef>
+        </p:style>
+        <p:txBody>
+          <a:bodyPr rot="0" spcFirstLastPara="0" vertOverflow="overflow" horzOverflow="overflow" vert="horz" wrap="square" lIns="91440" tIns="45720" rIns="91440" bIns="45720" numCol="1" spcCol="0" rtlCol="0" fromWordArt="0" anchor="ctr" anchorCtr="0" forceAA="0" compatLnSpc="1">
+            <a:prstTxWarp prst="textNoShape">
+              <a:avLst/>
+            </a:prstTxWarp>
+            <a:noAutofit/>
+          </a:bodyPr>
+          <a:lstStyle/>
+          <a:p>
+            <a:pPr algn="ctr"/>
+            <a:r>
+              <a:rPr lang="en-US" dirty="0"/>
+              <a:t>Leaf Node. Balance: 100 ETH</a:t>
+            </a:r>
+          </a:p>
+        </p:txBody>
+      </p:sp>
+      <p:sp>
+        <p:nvSpPr>
+          <p:cNvPr id="9" name="Rounded Rectangle 8"/>
+          <p:cNvSpPr/>
+          <p:nvPr/>
+        </p:nvSpPr>
+        <p:spPr>
+          <a:xfrm>
+            <a:off x="3509819" y="2989603"/>
+            <a:ext cx="1992429" cy="580326"/>
+          </a:xfrm>
+          <a:prstGeom prst="roundRect">
+            <a:avLst/>
+          </a:prstGeom>
+          <a:solidFill>
+            <a:schemeClr val="accent1"/>
+          </a:solidFill>
+        </p:spPr>
+        <p:style>
+          <a:lnRef idx="2">
+            <a:schemeClr val="accent1">
+              <a:shade val="50000"/>
+            </a:schemeClr>
+          </a:lnRef>
+          <a:fillRef idx="1">
+            <a:schemeClr val="accent1"/>
+          </a:fillRef>
+          <a:effectRef idx="0">
+            <a:schemeClr val="accent1"/>
+          </a:effectRef>
+          <a:fontRef idx="minor">
+            <a:schemeClr val="lt1"/>
+          </a:fontRef>
+        </p:style>
+        <p:txBody>
+          <a:bodyPr rot="0" spcFirstLastPara="0" vertOverflow="overflow" horzOverflow="overflow" vert="horz" wrap="square" lIns="91440" tIns="45720" rIns="91440" bIns="45720" numCol="1" spcCol="0" rtlCol="0" fromWordArt="0" anchor="ctr" anchorCtr="0" forceAA="0" compatLnSpc="1">
+            <a:prstTxWarp prst="textNoShape">
+              <a:avLst/>
+            </a:prstTxWarp>
+            <a:noAutofit/>
+          </a:bodyPr>
+          <a:lstStyle/>
+          <a:p>
+            <a:pPr algn="ctr"/>
+            <a:r>
+              <a:rPr lang="en-US" dirty="0"/>
+              <a:t>Leaf Node. Balance: 10 ETH</a:t>
+            </a:r>
+          </a:p>
+        </p:txBody>
+      </p:sp>
+      <p:sp>
+        <p:nvSpPr>
+          <p:cNvPr id="10" name="Rounded Rectangle 9"/>
+          <p:cNvSpPr/>
+          <p:nvPr/>
+        </p:nvSpPr>
+        <p:spPr>
+          <a:xfrm>
+            <a:off x="6474401" y="2989603"/>
+            <a:ext cx="1992429" cy="580326"/>
+          </a:xfrm>
+          <a:prstGeom prst="roundRect">
+            <a:avLst/>
+          </a:prstGeom>
+          <a:solidFill>
+            <a:schemeClr val="accent6"/>
+          </a:solidFill>
+        </p:spPr>
+        <p:style>
+          <a:lnRef idx="2">
+            <a:schemeClr val="accent1">
+              <a:shade val="50000"/>
+            </a:schemeClr>
+          </a:lnRef>
+          <a:fillRef idx="1">
+            <a:schemeClr val="accent1"/>
+          </a:fillRef>
+          <a:effectRef idx="0">
+            <a:schemeClr val="accent1"/>
+          </a:effectRef>
+          <a:fontRef idx="minor">
+            <a:schemeClr val="lt1"/>
+          </a:fontRef>
+        </p:style>
+        <p:txBody>
+          <a:bodyPr rot="0" spcFirstLastPara="0" vertOverflow="overflow" horzOverflow="overflow" vert="horz" wrap="square" lIns="91440" tIns="45720" rIns="91440" bIns="45720" numCol="1" spcCol="0" rtlCol="0" fromWordArt="0" anchor="ctr" anchorCtr="0" forceAA="0" compatLnSpc="1">
+            <a:prstTxWarp prst="textNoShape">
+              <a:avLst/>
+            </a:prstTxWarp>
+            <a:noAutofit/>
+          </a:bodyPr>
+          <a:lstStyle/>
+          <a:p>
+            <a:pPr algn="ctr"/>
+            <a:r>
+              <a:rPr lang="en-US" dirty="0"/>
+              <a:t>Leaf Node. Balance: 12 ETH</a:t>
+            </a:r>
+          </a:p>
+        </p:txBody>
+      </p:sp>
+      <p:sp>
+        <p:nvSpPr>
+          <p:cNvPr id="11" name="Rounded Rectangle 10"/>
+          <p:cNvSpPr/>
+          <p:nvPr/>
+        </p:nvSpPr>
+        <p:spPr>
+          <a:xfrm>
+            <a:off x="9438983" y="2989603"/>
+            <a:ext cx="1992429" cy="580326"/>
+          </a:xfrm>
+          <a:prstGeom prst="roundRect">
+            <a:avLst/>
+          </a:prstGeom>
+          <a:solidFill>
+            <a:schemeClr val="accent2">
+              <a:lumMod val="75000"/>
+            </a:schemeClr>
+          </a:solidFill>
+        </p:spPr>
+        <p:style>
+          <a:lnRef idx="2">
+            <a:schemeClr val="accent1">
+              <a:shade val="50000"/>
+            </a:schemeClr>
+          </a:lnRef>
+          <a:fillRef idx="1">
+            <a:schemeClr val="accent1"/>
+          </a:fillRef>
+          <a:effectRef idx="0">
+            <a:schemeClr val="accent1"/>
+          </a:effectRef>
+          <a:fontRef idx="minor">
+            <a:schemeClr val="lt1"/>
+          </a:fontRef>
+        </p:style>
+        <p:txBody>
+          <a:bodyPr rot="0" spcFirstLastPara="0" vertOverflow="overflow" horzOverflow="overflow" vert="horz" wrap="square" lIns="91440" tIns="45720" rIns="91440" bIns="45720" numCol="1" spcCol="0" rtlCol="0" fromWordArt="0" anchor="ctr" anchorCtr="0" forceAA="0" compatLnSpc="1">
+            <a:prstTxWarp prst="textNoShape">
+              <a:avLst/>
+            </a:prstTxWarp>
+            <a:noAutofit/>
+          </a:bodyPr>
+          <a:lstStyle/>
+          <a:p>
+            <a:pPr algn="ctr"/>
+            <a:r>
+              <a:rPr lang="en-US" dirty="0"/>
+              <a:t>Leaf Node. Balance: 50 ETH</a:t>
+            </a:r>
+          </a:p>
+        </p:txBody>
+      </p:sp>
+      <p:cxnSp>
+        <p:nvCxnSpPr>
+          <p:cNvPr id="13" name="Straight Arrow Connector 12"/>
+          <p:cNvCxnSpPr/>
+          <p:nvPr/>
+        </p:nvCxnSpPr>
+        <p:spPr>
+          <a:xfrm flipH="1">
+            <a:off x="3634946" y="1044112"/>
+            <a:ext cx="2353379" cy="608853"/>
+          </a:xfrm>
+          <a:prstGeom prst="straightConnector1">
+            <a:avLst/>
+          </a:prstGeom>
+          <a:ln w="47625">
+            <a:tailEnd type="triangle"/>
+          </a:ln>
+        </p:spPr>
+        <p:style>
+          <a:lnRef idx="1">
+            <a:schemeClr val="accent1"/>
+          </a:lnRef>
+          <a:fillRef idx="0">
+            <a:schemeClr val="accent1"/>
+          </a:fillRef>
+          <a:effectRef idx="0">
+            <a:schemeClr val="accent1"/>
+          </a:effectRef>
+          <a:fontRef idx="minor">
+            <a:schemeClr val="tx1"/>
+          </a:fontRef>
+        </p:style>
+      </p:cxnSp>
+      <p:cxnSp>
+        <p:nvCxnSpPr>
+          <p:cNvPr id="14" name="Straight Arrow Connector 13"/>
+          <p:cNvCxnSpPr/>
+          <p:nvPr/>
+        </p:nvCxnSpPr>
+        <p:spPr>
+          <a:xfrm>
+            <a:off x="5982784" y="1043514"/>
+            <a:ext cx="2350008" cy="608853"/>
+          </a:xfrm>
+          <a:prstGeom prst="straightConnector1">
+            <a:avLst/>
+          </a:prstGeom>
+          <a:ln w="47625">
+            <a:tailEnd type="triangle"/>
+          </a:ln>
+        </p:spPr>
+        <p:style>
+          <a:lnRef idx="1">
+            <a:schemeClr val="accent1"/>
+          </a:lnRef>
+          <a:fillRef idx="0">
+            <a:schemeClr val="accent1"/>
+          </a:fillRef>
+          <a:effectRef idx="0">
+            <a:schemeClr val="accent1"/>
+          </a:effectRef>
+          <a:fontRef idx="minor">
+            <a:schemeClr val="tx1"/>
+          </a:fontRef>
+        </p:style>
+      </p:cxnSp>
+      <p:cxnSp>
+        <p:nvCxnSpPr>
+          <p:cNvPr id="15" name="Straight Arrow Connector 14"/>
+          <p:cNvCxnSpPr/>
+          <p:nvPr/>
+        </p:nvCxnSpPr>
+        <p:spPr>
+          <a:xfrm flipH="1">
+            <a:off x="1541452" y="2381347"/>
+            <a:ext cx="1968367" cy="608256"/>
+          </a:xfrm>
+          <a:prstGeom prst="straightConnector1">
+            <a:avLst/>
+          </a:prstGeom>
+          <a:ln w="47625">
+            <a:tailEnd type="triangle"/>
+          </a:ln>
+        </p:spPr>
+        <p:style>
+          <a:lnRef idx="1">
+            <a:schemeClr val="accent1"/>
+          </a:lnRef>
+          <a:fillRef idx="0">
+            <a:schemeClr val="accent1"/>
+          </a:fillRef>
+          <a:effectRef idx="0">
+            <a:schemeClr val="accent1"/>
+          </a:effectRef>
+          <a:fontRef idx="minor">
+            <a:schemeClr val="tx1"/>
+          </a:fontRef>
+        </p:style>
+      </p:cxnSp>
+      <p:cxnSp>
+        <p:nvCxnSpPr>
+          <p:cNvPr id="18" name="Straight Arrow Connector 17"/>
+          <p:cNvCxnSpPr/>
+          <p:nvPr/>
+        </p:nvCxnSpPr>
+        <p:spPr>
+          <a:xfrm flipH="1">
+            <a:off x="7470608" y="2380749"/>
+            <a:ext cx="996214" cy="608854"/>
+          </a:xfrm>
+          <a:prstGeom prst="straightConnector1">
+            <a:avLst/>
+          </a:prstGeom>
+          <a:ln w="47625">
+            <a:tailEnd type="triangle"/>
+          </a:ln>
+        </p:spPr>
+        <p:style>
+          <a:lnRef idx="1">
+            <a:schemeClr val="accent1"/>
+          </a:lnRef>
+          <a:fillRef idx="0">
+            <a:schemeClr val="accent1"/>
+          </a:fillRef>
+          <a:effectRef idx="0">
+            <a:schemeClr val="accent1"/>
+          </a:effectRef>
+          <a:fontRef idx="minor">
+            <a:schemeClr val="tx1"/>
+          </a:fontRef>
+        </p:style>
+      </p:cxnSp>
+      <p:cxnSp>
+        <p:nvCxnSpPr>
+          <p:cNvPr id="21" name="Straight Arrow Connector 20"/>
+          <p:cNvCxnSpPr/>
+          <p:nvPr/>
+        </p:nvCxnSpPr>
+        <p:spPr>
+          <a:xfrm>
+            <a:off x="3497781" y="2380749"/>
+            <a:ext cx="996214" cy="608854"/>
+          </a:xfrm>
+          <a:prstGeom prst="straightConnector1">
+            <a:avLst/>
+          </a:prstGeom>
+          <a:ln w="47625">
+            <a:tailEnd type="triangle"/>
+          </a:ln>
+        </p:spPr>
+        <p:style>
+          <a:lnRef idx="1">
+            <a:schemeClr val="accent1"/>
+          </a:lnRef>
+          <a:fillRef idx="0">
+            <a:schemeClr val="accent1"/>
+          </a:fillRef>
+          <a:effectRef idx="0">
+            <a:schemeClr val="accent1"/>
+          </a:effectRef>
+          <a:fontRef idx="minor">
+            <a:schemeClr val="tx1"/>
+          </a:fontRef>
+        </p:style>
+      </p:cxnSp>
+      <p:cxnSp>
+        <p:nvCxnSpPr>
+          <p:cNvPr id="22" name="Straight Arrow Connector 21"/>
+          <p:cNvCxnSpPr/>
+          <p:nvPr/>
+        </p:nvCxnSpPr>
+        <p:spPr>
+          <a:xfrm>
+            <a:off x="8478861" y="2380749"/>
+            <a:ext cx="1968367" cy="608256"/>
+          </a:xfrm>
+          <a:prstGeom prst="straightConnector1">
+            <a:avLst/>
+          </a:prstGeom>
+          <a:ln w="47625">
+            <a:tailEnd type="triangle"/>
+          </a:ln>
+        </p:spPr>
+        <p:style>
+          <a:lnRef idx="1">
+            <a:schemeClr val="accent1"/>
+          </a:lnRef>
+          <a:fillRef idx="0">
+            <a:schemeClr val="accent1"/>
+          </a:fillRef>
+          <a:effectRef idx="0">
+            <a:schemeClr val="accent1"/>
+          </a:effectRef>
+          <a:fontRef idx="minor">
+            <a:schemeClr val="tx1"/>
+          </a:fontRef>
+        </p:style>
+      </p:cxnSp>
+      <mc:AlternateContent xmlns:mc="http://schemas.openxmlformats.org/markup-compatibility/2006">
+        <mc:Choice xmlns:a14="http://schemas.microsoft.com/office/drawing/2010/main" Requires="a14">
+          <p:sp>
+            <p:nvSpPr>
+              <p:cNvPr id="2" name="TextBox 1">
+                <a:extLst>
+                  <a:ext uri="{FF2B5EF4-FFF2-40B4-BE49-F238E27FC236}">
+                    <a16:creationId xmlns:a16="http://schemas.microsoft.com/office/drawing/2014/main" id="{BC2244AD-6956-1247-9C7F-E6153BE166F3}"/>
+                  </a:ext>
+                </a:extLst>
+              </p:cNvPr>
+              <p:cNvSpPr txBox="1"/>
+              <p:nvPr/>
+            </p:nvSpPr>
+            <p:spPr>
+              <a:xfrm>
+                <a:off x="3509811" y="326273"/>
+                <a:ext cx="360987" cy="353943"/>
+              </a:xfrm>
+              <a:prstGeom prst="rect">
+                <a:avLst/>
+              </a:prstGeom>
+              <a:noFill/>
+            </p:spPr>
+            <p:txBody>
+              <a:bodyPr wrap="square" rtlCol="0">
+                <a:spAutoFit/>
+              </a:bodyPr>
+              <a:lstStyle/>
+              <a:p>
+                <a14:m>
+                  <m:oMathPara xmlns:m="http://schemas.openxmlformats.org/officeDocument/2006/math">
+                    <m:oMathParaPr>
+                      <m:jc m:val="centerGroup"/>
+                    </m:oMathParaPr>
+                    <m:oMath xmlns:m="http://schemas.openxmlformats.org/officeDocument/2006/math">
+                      <m:sSub>
+                        <m:sSubPr>
+                          <m:ctrlPr>
+                            <a:rPr lang="en-US" b="0" i="1" smtClean="0">
+                              <a:solidFill>
+                                <a:schemeClr val="bg1"/>
+                              </a:solidFill>
+                              <a:latin typeface="Cambria Math" panose="02040503050406030204" pitchFamily="18" charset="0"/>
+                            </a:rPr>
+                          </m:ctrlPr>
+                        </m:sSubPr>
+                        <m:e>
+                          <m:r>
+                            <a:rPr lang="en-US" b="0" i="1" smtClean="0">
+                              <a:solidFill>
+                                <a:schemeClr val="bg1"/>
+                              </a:solidFill>
+                              <a:latin typeface="Cambria Math" panose="02040503050406030204" pitchFamily="18" charset="0"/>
+                            </a:rPr>
+                            <m:t>𝑁</m:t>
+                          </m:r>
+                        </m:e>
+                        <m:sub>
+                          <m:r>
+                            <a:rPr lang="en-US" b="0" i="1" smtClean="0">
+                              <a:solidFill>
+                                <a:schemeClr val="bg1"/>
+                              </a:solidFill>
+                              <a:latin typeface="Cambria Math" panose="02040503050406030204" pitchFamily="18" charset="0"/>
+                            </a:rPr>
+                            <m:t>1</m:t>
+                          </m:r>
+                        </m:sub>
+                      </m:sSub>
+                    </m:oMath>
+                  </m:oMathPara>
+                </a14:m>
+                <a:endParaRPr lang="en-US" dirty="0">
+                  <a:solidFill>
+                    <a:schemeClr val="bg1"/>
+                  </a:solidFill>
+                </a:endParaRPr>
+              </a:p>
+            </p:txBody>
+          </p:sp>
+        </mc:Choice>
+        <mc:Fallback>
+          <p:sp>
+            <p:nvSpPr>
+              <p:cNvPr id="2" name="TextBox 1">
+                <a:extLst>
+                  <a:ext uri="{FF2B5EF4-FFF2-40B4-BE49-F238E27FC236}">
+                    <a16:creationId xmlns:a16="http://schemas.microsoft.com/office/drawing/2014/main" id="{BC2244AD-6956-1247-9C7F-E6153BE166F3}"/>
+                  </a:ext>
+                </a:extLst>
+              </p:cNvPr>
+              <p:cNvSpPr txBox="1">
+                <a:spLocks noRot="1" noChangeAspect="1" noMove="1" noResize="1" noEditPoints="1" noAdjustHandles="1" noChangeArrowheads="1" noChangeShapeType="1" noTextEdit="1"/>
+              </p:cNvSpPr>
+              <p:nvPr/>
+            </p:nvSpPr>
+            <p:spPr>
+              <a:xfrm>
+                <a:off x="3509811" y="326273"/>
+                <a:ext cx="360987" cy="353943"/>
+              </a:xfrm>
+              <a:prstGeom prst="rect">
+                <a:avLst/>
+              </a:prstGeom>
+              <a:blipFill>
+                <a:blip r:embed="rId2"/>
+                <a:stretch>
+                  <a:fillRect/>
+                </a:stretch>
+              </a:blipFill>
+            </p:spPr>
+            <p:txBody>
+              <a:bodyPr/>
+              <a:lstStyle/>
+              <a:p>
+                <a:r>
+                  <a:rPr lang="en-US">
+                    <a:noFill/>
+                  </a:rPr>
+                  <a:t> </a:t>
+                </a:r>
+              </a:p>
+            </p:txBody>
+          </p:sp>
+        </mc:Fallback>
+      </mc:AlternateContent>
+      <mc:AlternateContent xmlns:mc="http://schemas.openxmlformats.org/markup-compatibility/2006">
+        <mc:Choice xmlns:a14="http://schemas.microsoft.com/office/drawing/2010/main" Requires="a14">
+          <p:sp>
+            <p:nvSpPr>
+              <p:cNvPr id="16" name="TextBox 15">
+                <a:extLst>
+                  <a:ext uri="{FF2B5EF4-FFF2-40B4-BE49-F238E27FC236}">
+                    <a16:creationId xmlns:a16="http://schemas.microsoft.com/office/drawing/2014/main" id="{5E08711E-7A14-5C40-8069-F926AB414BA6}"/>
+                  </a:ext>
+                </a:extLst>
+              </p:cNvPr>
+              <p:cNvSpPr txBox="1"/>
+              <p:nvPr/>
+            </p:nvSpPr>
+            <p:spPr>
+              <a:xfrm>
+                <a:off x="1820577" y="1652367"/>
+                <a:ext cx="360987" cy="353943"/>
+              </a:xfrm>
+              <a:prstGeom prst="rect">
+                <a:avLst/>
+              </a:prstGeom>
+              <a:noFill/>
+            </p:spPr>
+            <p:txBody>
+              <a:bodyPr wrap="square" rtlCol="0">
+                <a:spAutoFit/>
+              </a:bodyPr>
+              <a:lstStyle/>
+              <a:p>
+                <a14:m>
+                  <m:oMathPara xmlns:m="http://schemas.openxmlformats.org/officeDocument/2006/math">
+                    <m:oMathParaPr>
+                      <m:jc m:val="centerGroup"/>
+                    </m:oMathParaPr>
+                    <m:oMath xmlns:m="http://schemas.openxmlformats.org/officeDocument/2006/math">
+                      <m:sSub>
+                        <m:sSubPr>
+                          <m:ctrlPr>
+                            <a:rPr lang="en-US" b="0" i="1" smtClean="0">
+                              <a:solidFill>
+                                <a:schemeClr val="bg1"/>
+                              </a:solidFill>
+                              <a:latin typeface="Cambria Math" panose="02040503050406030204" pitchFamily="18" charset="0"/>
+                            </a:rPr>
+                          </m:ctrlPr>
+                        </m:sSubPr>
+                        <m:e>
+                          <m:r>
+                            <a:rPr lang="en-US" b="0" i="1" smtClean="0">
+                              <a:solidFill>
+                                <a:schemeClr val="bg1"/>
+                              </a:solidFill>
+                              <a:latin typeface="Cambria Math" panose="02040503050406030204" pitchFamily="18" charset="0"/>
+                            </a:rPr>
+                            <m:t>𝑁</m:t>
+                          </m:r>
+                        </m:e>
+                        <m:sub>
+                          <m:r>
+                            <a:rPr lang="en-US" b="0" i="1" smtClean="0">
+                              <a:solidFill>
+                                <a:schemeClr val="bg1"/>
+                              </a:solidFill>
+                              <a:latin typeface="Cambria Math" panose="02040503050406030204" pitchFamily="18" charset="0"/>
+                            </a:rPr>
+                            <m:t>2</m:t>
+                          </m:r>
+                        </m:sub>
+                      </m:sSub>
+                    </m:oMath>
+                  </m:oMathPara>
+                </a14:m>
+                <a:endParaRPr lang="en-US" dirty="0">
+                  <a:solidFill>
+                    <a:schemeClr val="bg1"/>
+                  </a:solidFill>
+                </a:endParaRPr>
+              </a:p>
+            </p:txBody>
+          </p:sp>
+        </mc:Choice>
+        <mc:Fallback>
+          <p:sp>
+            <p:nvSpPr>
+              <p:cNvPr id="16" name="TextBox 15">
+                <a:extLst>
+                  <a:ext uri="{FF2B5EF4-FFF2-40B4-BE49-F238E27FC236}">
+                    <a16:creationId xmlns:a16="http://schemas.microsoft.com/office/drawing/2014/main" id="{5E08711E-7A14-5C40-8069-F926AB414BA6}"/>
+                  </a:ext>
+                </a:extLst>
+              </p:cNvPr>
+              <p:cNvSpPr txBox="1">
+                <a:spLocks noRot="1" noChangeAspect="1" noMove="1" noResize="1" noEditPoints="1" noAdjustHandles="1" noChangeArrowheads="1" noChangeShapeType="1" noTextEdit="1"/>
+              </p:cNvSpPr>
+              <p:nvPr/>
+            </p:nvSpPr>
+            <p:spPr>
+              <a:xfrm>
+                <a:off x="1820577" y="1652367"/>
+                <a:ext cx="360987" cy="353943"/>
+              </a:xfrm>
+              <a:prstGeom prst="rect">
+                <a:avLst/>
+              </a:prstGeom>
+              <a:blipFill>
+                <a:blip r:embed="rId3"/>
+                <a:stretch>
+                  <a:fillRect/>
+                </a:stretch>
+              </a:blipFill>
+            </p:spPr>
+            <p:txBody>
+              <a:bodyPr/>
+              <a:lstStyle/>
+              <a:p>
+                <a:r>
+                  <a:rPr lang="en-US">
+                    <a:noFill/>
+                  </a:rPr>
+                  <a:t> </a:t>
+                </a:r>
+              </a:p>
+            </p:txBody>
+          </p:sp>
+        </mc:Fallback>
+      </mc:AlternateContent>
+      <mc:AlternateContent xmlns:mc="http://schemas.openxmlformats.org/markup-compatibility/2006">
+        <mc:Choice xmlns:a14="http://schemas.microsoft.com/office/drawing/2010/main" Requires="a14">
+          <p:sp>
+            <p:nvSpPr>
+              <p:cNvPr id="17" name="TextBox 16">
+                <a:extLst>
+                  <a:ext uri="{FF2B5EF4-FFF2-40B4-BE49-F238E27FC236}">
+                    <a16:creationId xmlns:a16="http://schemas.microsoft.com/office/drawing/2014/main" id="{2E6C53C7-3402-C14B-861D-69A5F433B93F}"/>
+                  </a:ext>
+                </a:extLst>
+              </p:cNvPr>
+              <p:cNvSpPr txBox="1"/>
+              <p:nvPr/>
+            </p:nvSpPr>
+            <p:spPr>
+              <a:xfrm>
+                <a:off x="6772064" y="1652366"/>
+                <a:ext cx="360987" cy="353943"/>
+              </a:xfrm>
+              <a:prstGeom prst="rect">
+                <a:avLst/>
+              </a:prstGeom>
+              <a:noFill/>
+            </p:spPr>
+            <p:txBody>
+              <a:bodyPr wrap="square" rtlCol="0">
+                <a:spAutoFit/>
+              </a:bodyPr>
+              <a:lstStyle/>
+              <a:p>
+                <a14:m>
+                  <m:oMathPara xmlns:m="http://schemas.openxmlformats.org/officeDocument/2006/math">
+                    <m:oMathParaPr>
+                      <m:jc m:val="centerGroup"/>
+                    </m:oMathParaPr>
+                    <m:oMath xmlns:m="http://schemas.openxmlformats.org/officeDocument/2006/math">
+                      <m:sSub>
+                        <m:sSubPr>
+                          <m:ctrlPr>
+                            <a:rPr lang="en-US" b="0" i="1" smtClean="0">
+                              <a:solidFill>
+                                <a:schemeClr val="bg1"/>
+                              </a:solidFill>
+                              <a:latin typeface="Cambria Math" panose="02040503050406030204" pitchFamily="18" charset="0"/>
+                            </a:rPr>
+                          </m:ctrlPr>
+                        </m:sSubPr>
+                        <m:e>
+                          <m:r>
+                            <a:rPr lang="en-US" b="0" i="1" smtClean="0">
+                              <a:solidFill>
+                                <a:schemeClr val="bg1"/>
+                              </a:solidFill>
+                              <a:latin typeface="Cambria Math" panose="02040503050406030204" pitchFamily="18" charset="0"/>
+                            </a:rPr>
+                            <m:t>𝑁</m:t>
+                          </m:r>
+                        </m:e>
+                        <m:sub>
+                          <m:r>
+                            <a:rPr lang="en-US" b="0" i="1" smtClean="0">
+                              <a:solidFill>
+                                <a:schemeClr val="bg1"/>
+                              </a:solidFill>
+                              <a:latin typeface="Cambria Math" panose="02040503050406030204" pitchFamily="18" charset="0"/>
+                            </a:rPr>
+                            <m:t>3</m:t>
+                          </m:r>
+                        </m:sub>
+                      </m:sSub>
+                    </m:oMath>
+                  </m:oMathPara>
+                </a14:m>
+                <a:endParaRPr lang="en-US" dirty="0">
+                  <a:solidFill>
+                    <a:schemeClr val="bg1"/>
+                  </a:solidFill>
+                </a:endParaRPr>
+              </a:p>
+            </p:txBody>
+          </p:sp>
+        </mc:Choice>
+        <mc:Fallback>
+          <p:sp>
+            <p:nvSpPr>
+              <p:cNvPr id="17" name="TextBox 16">
+                <a:extLst>
+                  <a:ext uri="{FF2B5EF4-FFF2-40B4-BE49-F238E27FC236}">
+                    <a16:creationId xmlns:a16="http://schemas.microsoft.com/office/drawing/2014/main" id="{2E6C53C7-3402-C14B-861D-69A5F433B93F}"/>
+                  </a:ext>
+                </a:extLst>
+              </p:cNvPr>
+              <p:cNvSpPr txBox="1">
+                <a:spLocks noRot="1" noChangeAspect="1" noMove="1" noResize="1" noEditPoints="1" noAdjustHandles="1" noChangeArrowheads="1" noChangeShapeType="1" noTextEdit="1"/>
+              </p:cNvSpPr>
+              <p:nvPr/>
+            </p:nvSpPr>
+            <p:spPr>
+              <a:xfrm>
+                <a:off x="6772064" y="1652366"/>
+                <a:ext cx="360987" cy="353943"/>
+              </a:xfrm>
+              <a:prstGeom prst="rect">
+                <a:avLst/>
+              </a:prstGeom>
+              <a:blipFill>
+                <a:blip r:embed="rId4"/>
+                <a:stretch>
+                  <a:fillRect r="-3333"/>
+                </a:stretch>
+              </a:blipFill>
+            </p:spPr>
+            <p:txBody>
+              <a:bodyPr/>
+              <a:lstStyle/>
+              <a:p>
+                <a:r>
+                  <a:rPr lang="en-US">
+                    <a:noFill/>
+                  </a:rPr>
+                  <a:t> </a:t>
+                </a:r>
+              </a:p>
+            </p:txBody>
+          </p:sp>
+        </mc:Fallback>
+      </mc:AlternateContent>
+      <mc:AlternateContent xmlns:mc="http://schemas.openxmlformats.org/markup-compatibility/2006">
+        <mc:Choice xmlns:a14="http://schemas.microsoft.com/office/drawing/2010/main" Requires="a14">
+          <p:sp>
+            <p:nvSpPr>
+              <p:cNvPr id="19" name="TextBox 18">
+                <a:extLst>
+                  <a:ext uri="{FF2B5EF4-FFF2-40B4-BE49-F238E27FC236}">
+                    <a16:creationId xmlns:a16="http://schemas.microsoft.com/office/drawing/2014/main" id="{0A8BB372-4EFF-3C41-846D-3EEBE5FCA62F}"/>
+                  </a:ext>
+                </a:extLst>
+              </p:cNvPr>
+              <p:cNvSpPr txBox="1"/>
+              <p:nvPr/>
+            </p:nvSpPr>
+            <p:spPr>
+              <a:xfrm>
+                <a:off x="545235" y="3215986"/>
+                <a:ext cx="360987" cy="353943"/>
+              </a:xfrm>
+              <a:prstGeom prst="rect">
+                <a:avLst/>
+              </a:prstGeom>
+              <a:noFill/>
+            </p:spPr>
+            <p:txBody>
+              <a:bodyPr wrap="square" rtlCol="0">
+                <a:spAutoFit/>
+              </a:bodyPr>
+              <a:lstStyle/>
+              <a:p>
+                <a14:m>
+                  <m:oMathPara xmlns:m="http://schemas.openxmlformats.org/officeDocument/2006/math">
+                    <m:oMathParaPr>
+                      <m:jc m:val="centerGroup"/>
+                    </m:oMathParaPr>
+                    <m:oMath xmlns:m="http://schemas.openxmlformats.org/officeDocument/2006/math">
+                      <m:sSub>
+                        <m:sSubPr>
+                          <m:ctrlPr>
+                            <a:rPr lang="en-US" b="0" i="1" smtClean="0">
+                              <a:solidFill>
+                                <a:schemeClr val="bg1"/>
+                              </a:solidFill>
+                              <a:latin typeface="Cambria Math" panose="02040503050406030204" pitchFamily="18" charset="0"/>
+                            </a:rPr>
+                          </m:ctrlPr>
+                        </m:sSubPr>
+                        <m:e>
+                          <m:r>
+                            <a:rPr lang="en-US" b="0" i="1" smtClean="0">
+                              <a:solidFill>
+                                <a:schemeClr val="bg1"/>
+                              </a:solidFill>
+                              <a:latin typeface="Cambria Math" panose="02040503050406030204" pitchFamily="18" charset="0"/>
+                            </a:rPr>
+                            <m:t>𝑁</m:t>
+                          </m:r>
+                        </m:e>
+                        <m:sub>
+                          <m:r>
+                            <a:rPr lang="en-US" b="0" i="1" smtClean="0">
+                              <a:solidFill>
+                                <a:schemeClr val="bg1"/>
+                              </a:solidFill>
+                              <a:latin typeface="Cambria Math" panose="02040503050406030204" pitchFamily="18" charset="0"/>
+                            </a:rPr>
+                            <m:t>4</m:t>
+                          </m:r>
+                        </m:sub>
+                      </m:sSub>
+                    </m:oMath>
+                  </m:oMathPara>
+                </a14:m>
+                <a:endParaRPr lang="en-US" dirty="0">
+                  <a:solidFill>
+                    <a:schemeClr val="bg1"/>
+                  </a:solidFill>
+                </a:endParaRPr>
+              </a:p>
+            </p:txBody>
+          </p:sp>
+        </mc:Choice>
+        <mc:Fallback>
+          <p:sp>
+            <p:nvSpPr>
+              <p:cNvPr id="19" name="TextBox 18">
+                <a:extLst>
+                  <a:ext uri="{FF2B5EF4-FFF2-40B4-BE49-F238E27FC236}">
+                    <a16:creationId xmlns:a16="http://schemas.microsoft.com/office/drawing/2014/main" id="{0A8BB372-4EFF-3C41-846D-3EEBE5FCA62F}"/>
+                  </a:ext>
+                </a:extLst>
+              </p:cNvPr>
+              <p:cNvSpPr txBox="1">
+                <a:spLocks noRot="1" noChangeAspect="1" noMove="1" noResize="1" noEditPoints="1" noAdjustHandles="1" noChangeArrowheads="1" noChangeShapeType="1" noTextEdit="1"/>
+              </p:cNvSpPr>
+              <p:nvPr/>
+            </p:nvSpPr>
+            <p:spPr>
+              <a:xfrm>
+                <a:off x="545235" y="3215986"/>
+                <a:ext cx="360987" cy="353943"/>
+              </a:xfrm>
+              <a:prstGeom prst="rect">
+                <a:avLst/>
+              </a:prstGeom>
+              <a:blipFill>
+                <a:blip r:embed="rId5"/>
+                <a:stretch>
+                  <a:fillRect r="-3448"/>
+                </a:stretch>
+              </a:blipFill>
+            </p:spPr>
+            <p:txBody>
+              <a:bodyPr/>
+              <a:lstStyle/>
+              <a:p>
+                <a:r>
+                  <a:rPr lang="en-US">
+                    <a:noFill/>
+                  </a:rPr>
+                  <a:t> </a:t>
+                </a:r>
+              </a:p>
+            </p:txBody>
+          </p:sp>
+        </mc:Fallback>
+      </mc:AlternateContent>
+      <mc:AlternateContent xmlns:mc="http://schemas.openxmlformats.org/markup-compatibility/2006">
+        <mc:Choice xmlns:a14="http://schemas.microsoft.com/office/drawing/2010/main" Requires="a14">
+          <p:sp>
+            <p:nvSpPr>
+              <p:cNvPr id="20" name="TextBox 19">
+                <a:extLst>
+                  <a:ext uri="{FF2B5EF4-FFF2-40B4-BE49-F238E27FC236}">
+                    <a16:creationId xmlns:a16="http://schemas.microsoft.com/office/drawing/2014/main" id="{151A1E2E-AB67-4A4E-B52E-E1CFA8AC595B}"/>
+                  </a:ext>
+                </a:extLst>
+              </p:cNvPr>
+              <p:cNvSpPr txBox="1"/>
+              <p:nvPr/>
+            </p:nvSpPr>
+            <p:spPr>
+              <a:xfrm>
+                <a:off x="3509810" y="3215986"/>
+                <a:ext cx="360987" cy="353943"/>
+              </a:xfrm>
+              <a:prstGeom prst="rect">
+                <a:avLst/>
+              </a:prstGeom>
+              <a:noFill/>
+            </p:spPr>
+            <p:txBody>
+              <a:bodyPr wrap="square" rtlCol="0">
+                <a:spAutoFit/>
+              </a:bodyPr>
+              <a:lstStyle/>
+              <a:p>
+                <a14:m>
+                  <m:oMathPara xmlns:m="http://schemas.openxmlformats.org/officeDocument/2006/math">
+                    <m:oMathParaPr>
+                      <m:jc m:val="centerGroup"/>
+                    </m:oMathParaPr>
+                    <m:oMath xmlns:m="http://schemas.openxmlformats.org/officeDocument/2006/math">
+                      <m:sSub>
+                        <m:sSubPr>
+                          <m:ctrlPr>
+                            <a:rPr lang="en-US" b="0" i="1" smtClean="0">
+                              <a:solidFill>
+                                <a:schemeClr val="bg1"/>
+                              </a:solidFill>
+                              <a:latin typeface="Cambria Math" panose="02040503050406030204" pitchFamily="18" charset="0"/>
+                            </a:rPr>
+                          </m:ctrlPr>
+                        </m:sSubPr>
+                        <m:e>
+                          <m:r>
+                            <a:rPr lang="en-US" b="0" i="1" smtClean="0">
+                              <a:solidFill>
+                                <a:schemeClr val="bg1"/>
+                              </a:solidFill>
+                              <a:latin typeface="Cambria Math" panose="02040503050406030204" pitchFamily="18" charset="0"/>
+                            </a:rPr>
+                            <m:t>𝑁</m:t>
+                          </m:r>
+                        </m:e>
+                        <m:sub>
+                          <m:r>
+                            <a:rPr lang="en-US" b="0" i="1" smtClean="0">
+                              <a:solidFill>
+                                <a:schemeClr val="bg1"/>
+                              </a:solidFill>
+                              <a:latin typeface="Cambria Math" panose="02040503050406030204" pitchFamily="18" charset="0"/>
+                            </a:rPr>
+                            <m:t>5</m:t>
+                          </m:r>
+                        </m:sub>
+                      </m:sSub>
+                    </m:oMath>
+                  </m:oMathPara>
+                </a14:m>
+                <a:endParaRPr lang="en-US" dirty="0">
+                  <a:solidFill>
+                    <a:schemeClr val="bg1"/>
+                  </a:solidFill>
+                </a:endParaRPr>
+              </a:p>
+            </p:txBody>
+          </p:sp>
+        </mc:Choice>
+        <mc:Fallback>
+          <p:sp>
+            <p:nvSpPr>
+              <p:cNvPr id="20" name="TextBox 19">
+                <a:extLst>
+                  <a:ext uri="{FF2B5EF4-FFF2-40B4-BE49-F238E27FC236}">
+                    <a16:creationId xmlns:a16="http://schemas.microsoft.com/office/drawing/2014/main" id="{151A1E2E-AB67-4A4E-B52E-E1CFA8AC595B}"/>
+                  </a:ext>
+                </a:extLst>
+              </p:cNvPr>
+              <p:cNvSpPr txBox="1">
+                <a:spLocks noRot="1" noChangeAspect="1" noMove="1" noResize="1" noEditPoints="1" noAdjustHandles="1" noChangeArrowheads="1" noChangeShapeType="1" noTextEdit="1"/>
+              </p:cNvSpPr>
+              <p:nvPr/>
+            </p:nvSpPr>
+            <p:spPr>
+              <a:xfrm>
+                <a:off x="3509810" y="3215986"/>
+                <a:ext cx="360987" cy="353943"/>
+              </a:xfrm>
+              <a:prstGeom prst="rect">
+                <a:avLst/>
+              </a:prstGeom>
+              <a:blipFill>
+                <a:blip r:embed="rId6"/>
+                <a:stretch>
+                  <a:fillRect r="-3448"/>
+                </a:stretch>
+              </a:blipFill>
+            </p:spPr>
+            <p:txBody>
+              <a:bodyPr/>
+              <a:lstStyle/>
+              <a:p>
+                <a:r>
+                  <a:rPr lang="en-US">
+                    <a:noFill/>
+                  </a:rPr>
+                  <a:t> </a:t>
+                </a:r>
+              </a:p>
+            </p:txBody>
+          </p:sp>
+        </mc:Fallback>
+      </mc:AlternateContent>
+      <mc:AlternateContent xmlns:mc="http://schemas.openxmlformats.org/markup-compatibility/2006">
+        <mc:Choice xmlns:a14="http://schemas.microsoft.com/office/drawing/2010/main" Requires="a14">
+          <p:sp>
+            <p:nvSpPr>
+              <p:cNvPr id="23" name="TextBox 22">
+                <a:extLst>
+                  <a:ext uri="{FF2B5EF4-FFF2-40B4-BE49-F238E27FC236}">
+                    <a16:creationId xmlns:a16="http://schemas.microsoft.com/office/drawing/2014/main" id="{BFE4FA42-E4C2-9A4F-9D99-71C29D20A8A8}"/>
+                  </a:ext>
+                </a:extLst>
+              </p:cNvPr>
+              <p:cNvSpPr txBox="1"/>
+              <p:nvPr/>
+            </p:nvSpPr>
+            <p:spPr>
+              <a:xfrm>
+                <a:off x="6474401" y="3215985"/>
+                <a:ext cx="360987" cy="353943"/>
+              </a:xfrm>
+              <a:prstGeom prst="rect">
+                <a:avLst/>
+              </a:prstGeom>
+              <a:noFill/>
+            </p:spPr>
+            <p:txBody>
+              <a:bodyPr wrap="square" rtlCol="0">
+                <a:spAutoFit/>
+              </a:bodyPr>
+              <a:lstStyle/>
+              <a:p>
+                <a14:m>
+                  <m:oMathPara xmlns:m="http://schemas.openxmlformats.org/officeDocument/2006/math">
+                    <m:oMathParaPr>
+                      <m:jc m:val="centerGroup"/>
+                    </m:oMathParaPr>
+                    <m:oMath xmlns:m="http://schemas.openxmlformats.org/officeDocument/2006/math">
+                      <m:sSub>
+                        <m:sSubPr>
+                          <m:ctrlPr>
+                            <a:rPr lang="en-US" b="0" i="1" smtClean="0">
+                              <a:solidFill>
+                                <a:schemeClr val="bg1"/>
+                              </a:solidFill>
+                              <a:latin typeface="Cambria Math" panose="02040503050406030204" pitchFamily="18" charset="0"/>
+                            </a:rPr>
+                          </m:ctrlPr>
+                        </m:sSubPr>
+                        <m:e>
+                          <m:r>
+                            <a:rPr lang="en-US" b="0" i="1" smtClean="0">
+                              <a:solidFill>
+                                <a:schemeClr val="bg1"/>
+                              </a:solidFill>
+                              <a:latin typeface="Cambria Math" panose="02040503050406030204" pitchFamily="18" charset="0"/>
+                            </a:rPr>
+                            <m:t>𝑁</m:t>
+                          </m:r>
+                        </m:e>
+                        <m:sub>
+                          <m:r>
+                            <a:rPr lang="en-US" b="0" i="1" smtClean="0">
+                              <a:solidFill>
+                                <a:schemeClr val="bg1"/>
+                              </a:solidFill>
+                              <a:latin typeface="Cambria Math" panose="02040503050406030204" pitchFamily="18" charset="0"/>
+                            </a:rPr>
+                            <m:t>6</m:t>
+                          </m:r>
+                        </m:sub>
+                      </m:sSub>
+                    </m:oMath>
+                  </m:oMathPara>
+                </a14:m>
+                <a:endParaRPr lang="en-US" dirty="0">
+                  <a:solidFill>
+                    <a:schemeClr val="bg1"/>
+                  </a:solidFill>
+                </a:endParaRPr>
+              </a:p>
+            </p:txBody>
+          </p:sp>
+        </mc:Choice>
+        <mc:Fallback>
+          <p:sp>
+            <p:nvSpPr>
+              <p:cNvPr id="23" name="TextBox 22">
+                <a:extLst>
+                  <a:ext uri="{FF2B5EF4-FFF2-40B4-BE49-F238E27FC236}">
+                    <a16:creationId xmlns:a16="http://schemas.microsoft.com/office/drawing/2014/main" id="{BFE4FA42-E4C2-9A4F-9D99-71C29D20A8A8}"/>
+                  </a:ext>
+                </a:extLst>
+              </p:cNvPr>
+              <p:cNvSpPr txBox="1">
+                <a:spLocks noRot="1" noChangeAspect="1" noMove="1" noResize="1" noEditPoints="1" noAdjustHandles="1" noChangeArrowheads="1" noChangeShapeType="1" noTextEdit="1"/>
+              </p:cNvSpPr>
+              <p:nvPr/>
+            </p:nvSpPr>
+            <p:spPr>
+              <a:xfrm>
+                <a:off x="6474401" y="3215985"/>
+                <a:ext cx="360987" cy="353943"/>
+              </a:xfrm>
+              <a:prstGeom prst="rect">
+                <a:avLst/>
+              </a:prstGeom>
+              <a:blipFill>
+                <a:blip r:embed="rId7"/>
+                <a:stretch>
+                  <a:fillRect r="-3448"/>
+                </a:stretch>
+              </a:blipFill>
+            </p:spPr>
+            <p:txBody>
+              <a:bodyPr/>
+              <a:lstStyle/>
+              <a:p>
+                <a:r>
+                  <a:rPr lang="en-US">
+                    <a:noFill/>
+                  </a:rPr>
+                  <a:t> </a:t>
+                </a:r>
+              </a:p>
+            </p:txBody>
+          </p:sp>
+        </mc:Fallback>
+      </mc:AlternateContent>
+      <mc:AlternateContent xmlns:mc="http://schemas.openxmlformats.org/markup-compatibility/2006">
+        <mc:Choice xmlns:a14="http://schemas.microsoft.com/office/drawing/2010/main" Requires="a14">
+          <p:sp>
+            <p:nvSpPr>
+              <p:cNvPr id="24" name="TextBox 23">
+                <a:extLst>
+                  <a:ext uri="{FF2B5EF4-FFF2-40B4-BE49-F238E27FC236}">
+                    <a16:creationId xmlns:a16="http://schemas.microsoft.com/office/drawing/2014/main" id="{3E39DEE8-01E8-2748-BF64-FA5C816687B4}"/>
+                  </a:ext>
+                </a:extLst>
+              </p:cNvPr>
+              <p:cNvSpPr txBox="1"/>
+              <p:nvPr/>
+            </p:nvSpPr>
+            <p:spPr>
+              <a:xfrm>
+                <a:off x="9438983" y="3201610"/>
+                <a:ext cx="360987" cy="353943"/>
+              </a:xfrm>
+              <a:prstGeom prst="rect">
+                <a:avLst/>
+              </a:prstGeom>
+              <a:noFill/>
+            </p:spPr>
+            <p:txBody>
+              <a:bodyPr wrap="square" rtlCol="0">
+                <a:spAutoFit/>
+              </a:bodyPr>
+              <a:lstStyle/>
+              <a:p>
+                <a14:m>
+                  <m:oMathPara xmlns:m="http://schemas.openxmlformats.org/officeDocument/2006/math">
+                    <m:oMathParaPr>
+                      <m:jc m:val="centerGroup"/>
+                    </m:oMathParaPr>
+                    <m:oMath xmlns:m="http://schemas.openxmlformats.org/officeDocument/2006/math">
+                      <m:sSub>
+                        <m:sSubPr>
+                          <m:ctrlPr>
+                            <a:rPr lang="en-US" b="0" i="1" smtClean="0">
+                              <a:solidFill>
+                                <a:schemeClr val="bg1"/>
+                              </a:solidFill>
+                              <a:latin typeface="Cambria Math" panose="02040503050406030204" pitchFamily="18" charset="0"/>
+                            </a:rPr>
+                          </m:ctrlPr>
+                        </m:sSubPr>
+                        <m:e>
+                          <m:r>
+                            <a:rPr lang="en-US" b="0" i="1" smtClean="0">
+                              <a:solidFill>
+                                <a:schemeClr val="bg1"/>
+                              </a:solidFill>
+                              <a:latin typeface="Cambria Math" panose="02040503050406030204" pitchFamily="18" charset="0"/>
+                            </a:rPr>
+                            <m:t>𝑁</m:t>
+                          </m:r>
+                        </m:e>
+                        <m:sub>
+                          <m:r>
+                            <a:rPr lang="en-US" b="0" i="1" smtClean="0">
+                              <a:solidFill>
+                                <a:schemeClr val="bg1"/>
+                              </a:solidFill>
+                              <a:latin typeface="Cambria Math" panose="02040503050406030204" pitchFamily="18" charset="0"/>
+                            </a:rPr>
+                            <m:t>7</m:t>
+                          </m:r>
+                        </m:sub>
+                      </m:sSub>
+                    </m:oMath>
+                  </m:oMathPara>
+                </a14:m>
+                <a:endParaRPr lang="en-US" dirty="0">
+                  <a:solidFill>
+                    <a:schemeClr val="bg1"/>
+                  </a:solidFill>
+                </a:endParaRPr>
+              </a:p>
+            </p:txBody>
+          </p:sp>
+        </mc:Choice>
+        <mc:Fallback>
+          <p:sp>
+            <p:nvSpPr>
+              <p:cNvPr id="24" name="TextBox 23">
+                <a:extLst>
+                  <a:ext uri="{FF2B5EF4-FFF2-40B4-BE49-F238E27FC236}">
+                    <a16:creationId xmlns:a16="http://schemas.microsoft.com/office/drawing/2014/main" id="{3E39DEE8-01E8-2748-BF64-FA5C816687B4}"/>
+                  </a:ext>
+                </a:extLst>
+              </p:cNvPr>
+              <p:cNvSpPr txBox="1">
+                <a:spLocks noRot="1" noChangeAspect="1" noMove="1" noResize="1" noEditPoints="1" noAdjustHandles="1" noChangeArrowheads="1" noChangeShapeType="1" noTextEdit="1"/>
+              </p:cNvSpPr>
+              <p:nvPr/>
+            </p:nvSpPr>
+            <p:spPr>
+              <a:xfrm>
+                <a:off x="9438983" y="3201610"/>
+                <a:ext cx="360987" cy="353943"/>
+              </a:xfrm>
+              <a:prstGeom prst="rect">
+                <a:avLst/>
+              </a:prstGeom>
+              <a:blipFill>
+                <a:blip r:embed="rId8"/>
+                <a:stretch>
+                  <a:fillRect/>
+                </a:stretch>
+              </a:blipFill>
+            </p:spPr>
+            <p:txBody>
+              <a:bodyPr/>
+              <a:lstStyle/>
+              <a:p>
+                <a:r>
+                  <a:rPr lang="en-US">
+                    <a:noFill/>
+                  </a:rPr>
+                  <a:t> </a:t>
+                </a:r>
+              </a:p>
+            </p:txBody>
+          </p:sp>
+        </mc:Fallback>
+      </mc:AlternateContent>
+    </p:spTree>
+    <p:extLst>
+      <p:ext uri="{BB962C8B-B14F-4D97-AF65-F5344CB8AC3E}">
+        <p14:creationId xmlns:p14="http://schemas.microsoft.com/office/powerpoint/2010/main" val="2698613823"/>
+      </p:ext>
+    </p:extLst>
+  </p:cSld>
+  <p:clrMapOvr>
+    <a:masterClrMapping/>
+  </p:clrMapOvr>
+</p:sld>
+</file>
+
+<file path=ppt/slides/slide3.xml><?xml version="1.0" encoding="utf-8"?>
+<p:sld xmlns:a="http://schemas.openxmlformats.org/drawingml/2006/main" xmlns:r="http://schemas.openxmlformats.org/officeDocument/2006/relationships" xmlns:p="http://schemas.openxmlformats.org/presentationml/2006/main">
+  <p:cSld>
+    <p:spTree>
+      <p:nvGrpSpPr>
+        <p:cNvPr id="1" name=""/>
+        <p:cNvGrpSpPr/>
+        <p:nvPr/>
+      </p:nvGrpSpPr>
+      <p:grpSpPr>
+        <a:xfrm>
+          <a:off x="0" y="0"/>
+          <a:ext cx="0" cy="0"/>
+          <a:chOff x="0" y="0"/>
+          <a:chExt cx="0" cy="0"/>
+        </a:xfrm>
+      </p:grpSpPr>
+      <p:sp>
+        <p:nvSpPr>
+          <p:cNvPr id="5" name="Rounded Rectangle 4"/>
+          <p:cNvSpPr/>
+          <p:nvPr/>
+        </p:nvSpPr>
+        <p:spPr>
+          <a:xfrm>
+            <a:off x="3509819" y="330920"/>
+            <a:ext cx="4957011" cy="713184"/>
+          </a:xfrm>
+          <a:prstGeom prst="roundRect">
+            <a:avLst/>
+          </a:prstGeom>
+          <a:solidFill>
+            <a:schemeClr val="accent6"/>
+          </a:solidFill>
+        </p:spPr>
+        <p:style>
+          <a:lnRef idx="2">
+            <a:schemeClr val="accent1">
+              <a:shade val="50000"/>
+            </a:schemeClr>
+          </a:lnRef>
+          <a:fillRef idx="1">
+            <a:schemeClr val="accent1"/>
+          </a:fillRef>
+          <a:effectRef idx="0">
+            <a:schemeClr val="accent1"/>
+          </a:effectRef>
+          <a:fontRef idx="minor">
+            <a:schemeClr val="lt1"/>
+          </a:fontRef>
+        </p:style>
+        <p:txBody>
+          <a:bodyPr rot="0" spcFirstLastPara="0" vertOverflow="overflow" horzOverflow="overflow" vert="horz" wrap="square" lIns="91440" tIns="45720" rIns="91440" bIns="45720" numCol="1" spcCol="0" rtlCol="0" fromWordArt="0" anchor="ctr" anchorCtr="0" forceAA="0" compatLnSpc="1">
+            <a:prstTxWarp prst="textNoShape">
+              <a:avLst/>
+            </a:prstTxWarp>
+            <a:noAutofit/>
+          </a:bodyPr>
+          <a:lstStyle/>
+          <a:p>
+            <a:pPr algn="ctr"/>
+            <a:r>
+              <a:rPr lang="en-US" dirty="0"/>
+              <a:t>Root Node</a:t>
+            </a:r>
+            <a:r>
+              <a:rPr lang="en-US"/>
+              <a:t>. </a:t>
+            </a:r>
+          </a:p>
+          <a:p>
+            <a:pPr algn="ctr"/>
+            <a:r>
+              <a:rPr lang="en-US" dirty="0"/>
+              <a:t>Children: [0x3244</a:t>
+            </a:r>
+            <a:r>
+              <a:rPr lang="mr-IN" dirty="0"/>
+              <a:t>…</a:t>
+            </a:r>
+            <a:r>
+              <a:rPr lang="en-US" dirty="0"/>
+              <a:t>f31e, 0x5484</a:t>
+            </a:r>
+            <a:r>
+              <a:rPr lang="mr-IN" dirty="0"/>
+              <a:t>…</a:t>
+            </a:r>
+            <a:r>
+              <a:rPr lang="en-US" dirty="0"/>
+              <a:t>20f1]</a:t>
+            </a:r>
+          </a:p>
+        </p:txBody>
+      </p:sp>
+      <p:sp>
+        <p:nvSpPr>
+          <p:cNvPr id="6" name="Rounded Rectangle 5"/>
+          <p:cNvSpPr/>
+          <p:nvPr/>
+        </p:nvSpPr>
+        <p:spPr>
+          <a:xfrm>
+            <a:off x="1820577" y="1653555"/>
+            <a:ext cx="3378468" cy="727792"/>
+          </a:xfrm>
+          <a:prstGeom prst="roundRect">
+            <a:avLst/>
+          </a:prstGeom>
+          <a:solidFill>
+            <a:schemeClr val="accent1"/>
+          </a:solidFill>
+        </p:spPr>
+        <p:style>
+          <a:lnRef idx="2">
+            <a:schemeClr val="accent1">
+              <a:shade val="50000"/>
+            </a:schemeClr>
+          </a:lnRef>
+          <a:fillRef idx="1">
+            <a:schemeClr val="accent1"/>
+          </a:fillRef>
+          <a:effectRef idx="0">
+            <a:schemeClr val="accent1"/>
+          </a:effectRef>
+          <a:fontRef idx="minor">
+            <a:schemeClr val="lt1"/>
+          </a:fontRef>
+        </p:style>
+        <p:txBody>
+          <a:bodyPr rot="0" spcFirstLastPara="0" vertOverflow="overflow" horzOverflow="overflow" vert="horz" wrap="square" lIns="91440" tIns="45720" rIns="91440" bIns="45720" numCol="1" spcCol="0" rtlCol="0" fromWordArt="0" anchor="ctr" anchorCtr="0" forceAA="0" compatLnSpc="1">
+            <a:prstTxWarp prst="textNoShape">
+              <a:avLst/>
+            </a:prstTxWarp>
+            <a:noAutofit/>
+          </a:bodyPr>
+          <a:lstStyle/>
+          <a:p>
+            <a:pPr algn="ctr"/>
+            <a:r>
+              <a:rPr lang="en-US" dirty="0"/>
+              <a:t>Non-leaf Node. Children: [0xf45e</a:t>
+            </a:r>
+            <a:r>
+              <a:rPr lang="mr-IN" dirty="0"/>
+              <a:t>…</a:t>
+            </a:r>
+            <a:r>
+              <a:rPr lang="en-US" dirty="0"/>
+              <a:t>3789, 0xa38c</a:t>
+            </a:r>
+            <a:r>
+              <a:rPr lang="mr-IN" dirty="0"/>
+              <a:t>…</a:t>
+            </a:r>
+            <a:r>
+              <a:rPr lang="en-US" dirty="0"/>
+              <a:t>f32b]</a:t>
+            </a:r>
+          </a:p>
+        </p:txBody>
+      </p:sp>
+      <p:sp>
+        <p:nvSpPr>
+          <p:cNvPr id="7" name="Rounded Rectangle 6"/>
+          <p:cNvSpPr/>
+          <p:nvPr/>
+        </p:nvSpPr>
+        <p:spPr>
+          <a:xfrm>
+            <a:off x="6777588" y="1652957"/>
+            <a:ext cx="3378468" cy="727792"/>
+          </a:xfrm>
+          <a:prstGeom prst="roundRect">
+            <a:avLst/>
+          </a:prstGeom>
+          <a:solidFill>
+            <a:schemeClr val="accent6"/>
+          </a:solidFill>
+        </p:spPr>
+        <p:style>
+          <a:lnRef idx="2">
+            <a:schemeClr val="accent1">
+              <a:shade val="50000"/>
+            </a:schemeClr>
+          </a:lnRef>
+          <a:fillRef idx="1">
+            <a:schemeClr val="accent1"/>
+          </a:fillRef>
+          <a:effectRef idx="0">
+            <a:schemeClr val="accent1"/>
+          </a:effectRef>
+          <a:fontRef idx="minor">
+            <a:schemeClr val="lt1"/>
+          </a:fontRef>
+        </p:style>
+        <p:txBody>
+          <a:bodyPr rot="0" spcFirstLastPara="0" vertOverflow="overflow" horzOverflow="overflow" vert="horz" wrap="square" lIns="91440" tIns="45720" rIns="91440" bIns="45720" numCol="1" spcCol="0" rtlCol="0" fromWordArt="0" anchor="ctr" anchorCtr="0" forceAA="0" compatLnSpc="1">
+            <a:prstTxWarp prst="textNoShape">
+              <a:avLst/>
+            </a:prstTxWarp>
+            <a:noAutofit/>
+          </a:bodyPr>
+          <a:lstStyle/>
+          <a:p>
+            <a:pPr algn="ctr"/>
+            <a:r>
+              <a:rPr lang="en-US" dirty="0"/>
+              <a:t>Non-leaf Node. Children: [0x78b4...4bc7, 0x983b</a:t>
+            </a:r>
+            <a:r>
+              <a:rPr lang="mr-IN" dirty="0"/>
+              <a:t>…</a:t>
+            </a:r>
+            <a:r>
+              <a:rPr lang="en-US" dirty="0"/>
+              <a:t>ff3e]</a:t>
+            </a:r>
+          </a:p>
+        </p:txBody>
+      </p:sp>
+      <p:sp>
+        <p:nvSpPr>
+          <p:cNvPr id="8" name="Rounded Rectangle 7"/>
+          <p:cNvSpPr/>
+          <p:nvPr/>
+        </p:nvSpPr>
+        <p:spPr>
+          <a:xfrm>
+            <a:off x="545235" y="2989603"/>
+            <a:ext cx="1992429" cy="580326"/>
+          </a:xfrm>
+          <a:prstGeom prst="roundRect">
+            <a:avLst/>
+          </a:prstGeom>
+          <a:solidFill>
+            <a:schemeClr val="accent1"/>
+          </a:solidFill>
+        </p:spPr>
+        <p:style>
+          <a:lnRef idx="2">
+            <a:schemeClr val="accent1">
+              <a:shade val="50000"/>
+            </a:schemeClr>
+          </a:lnRef>
+          <a:fillRef idx="1">
+            <a:schemeClr val="accent1"/>
+          </a:fillRef>
+          <a:effectRef idx="0">
+            <a:schemeClr val="accent1"/>
+          </a:effectRef>
+          <a:fontRef idx="minor">
+            <a:schemeClr val="lt1"/>
+          </a:fontRef>
+        </p:style>
+        <p:txBody>
+          <a:bodyPr rot="0" spcFirstLastPara="0" vertOverflow="overflow" horzOverflow="overflow" vert="horz" wrap="square" lIns="91440" tIns="45720" rIns="91440" bIns="45720" numCol="1" spcCol="0" rtlCol="0" fromWordArt="0" anchor="ctr" anchorCtr="0" forceAA="0" compatLnSpc="1">
+            <a:prstTxWarp prst="textNoShape">
+              <a:avLst/>
+            </a:prstTxWarp>
+            <a:noAutofit/>
+          </a:bodyPr>
+          <a:lstStyle/>
+          <a:p>
+            <a:pPr algn="ctr"/>
+            <a:r>
+              <a:rPr lang="en-US" dirty="0"/>
+              <a:t>Leaf Node. Balance: 100 ETH</a:t>
+            </a:r>
+          </a:p>
+        </p:txBody>
+      </p:sp>
+      <p:sp>
+        <p:nvSpPr>
+          <p:cNvPr id="9" name="Rounded Rectangle 8"/>
+          <p:cNvSpPr/>
+          <p:nvPr/>
+        </p:nvSpPr>
+        <p:spPr>
+          <a:xfrm>
+            <a:off x="3509819" y="2989603"/>
+            <a:ext cx="1992429" cy="580326"/>
+          </a:xfrm>
+          <a:prstGeom prst="roundRect">
+            <a:avLst/>
+          </a:prstGeom>
+          <a:solidFill>
+            <a:schemeClr val="accent1"/>
+          </a:solidFill>
+        </p:spPr>
+        <p:style>
+          <a:lnRef idx="2">
+            <a:schemeClr val="accent1">
+              <a:shade val="50000"/>
+            </a:schemeClr>
+          </a:lnRef>
+          <a:fillRef idx="1">
+            <a:schemeClr val="accent1"/>
+          </a:fillRef>
+          <a:effectRef idx="0">
+            <a:schemeClr val="accent1"/>
+          </a:effectRef>
+          <a:fontRef idx="minor">
+            <a:schemeClr val="lt1"/>
+          </a:fontRef>
+        </p:style>
+        <p:txBody>
+          <a:bodyPr rot="0" spcFirstLastPara="0" vertOverflow="overflow" horzOverflow="overflow" vert="horz" wrap="square" lIns="91440" tIns="45720" rIns="91440" bIns="45720" numCol="1" spcCol="0" rtlCol="0" fromWordArt="0" anchor="ctr" anchorCtr="0" forceAA="0" compatLnSpc="1">
+            <a:prstTxWarp prst="textNoShape">
+              <a:avLst/>
+            </a:prstTxWarp>
+            <a:noAutofit/>
+          </a:bodyPr>
+          <a:lstStyle/>
+          <a:p>
+            <a:pPr algn="ctr"/>
+            <a:r>
+              <a:rPr lang="en-US" dirty="0"/>
+              <a:t>Leaf Node. Balance: 10 ETH</a:t>
+            </a:r>
+          </a:p>
+        </p:txBody>
+      </p:sp>
+      <p:sp>
+        <p:nvSpPr>
+          <p:cNvPr id="10" name="Rounded Rectangle 9"/>
+          <p:cNvSpPr/>
+          <p:nvPr/>
+        </p:nvSpPr>
+        <p:spPr>
+          <a:xfrm>
+            <a:off x="6474401" y="2989603"/>
+            <a:ext cx="1992429" cy="580326"/>
+          </a:xfrm>
+          <a:prstGeom prst="roundRect">
+            <a:avLst/>
+          </a:prstGeom>
+          <a:solidFill>
+            <a:schemeClr val="accent6"/>
+          </a:solidFill>
+        </p:spPr>
+        <p:style>
+          <a:lnRef idx="2">
+            <a:schemeClr val="accent1">
+              <a:shade val="50000"/>
+            </a:schemeClr>
+          </a:lnRef>
+          <a:fillRef idx="1">
+            <a:schemeClr val="accent1"/>
+          </a:fillRef>
+          <a:effectRef idx="0">
+            <a:schemeClr val="accent1"/>
+          </a:effectRef>
+          <a:fontRef idx="minor">
+            <a:schemeClr val="lt1"/>
+          </a:fontRef>
+        </p:style>
+        <p:txBody>
+          <a:bodyPr rot="0" spcFirstLastPara="0" vertOverflow="overflow" horzOverflow="overflow" vert="horz" wrap="square" lIns="91440" tIns="45720" rIns="91440" bIns="45720" numCol="1" spcCol="0" rtlCol="0" fromWordArt="0" anchor="ctr" anchorCtr="0" forceAA="0" compatLnSpc="1">
+            <a:prstTxWarp prst="textNoShape">
+              <a:avLst/>
+            </a:prstTxWarp>
+            <a:noAutofit/>
+          </a:bodyPr>
+          <a:lstStyle/>
+          <a:p>
+            <a:pPr algn="ctr"/>
+            <a:r>
+              <a:rPr lang="en-US" dirty="0"/>
+              <a:t>Leaf Node. Balance: 12 ETH</a:t>
+            </a:r>
+          </a:p>
+        </p:txBody>
+      </p:sp>
+      <p:sp>
+        <p:nvSpPr>
+          <p:cNvPr id="11" name="Rounded Rectangle 10"/>
+          <p:cNvSpPr/>
+          <p:nvPr/>
+        </p:nvSpPr>
+        <p:spPr>
+          <a:xfrm>
+            <a:off x="9438983" y="2989603"/>
+            <a:ext cx="1992429" cy="580326"/>
+          </a:xfrm>
+          <a:prstGeom prst="roundRect">
+            <a:avLst/>
+          </a:prstGeom>
+          <a:solidFill>
+            <a:schemeClr val="accent1"/>
+          </a:solidFill>
+        </p:spPr>
+        <p:style>
+          <a:lnRef idx="2">
+            <a:schemeClr val="accent1">
+              <a:shade val="50000"/>
+            </a:schemeClr>
+          </a:lnRef>
+          <a:fillRef idx="1">
+            <a:schemeClr val="accent1"/>
+          </a:fillRef>
+          <a:effectRef idx="0">
+            <a:schemeClr val="accent1"/>
+          </a:effectRef>
+          <a:fontRef idx="minor">
+            <a:schemeClr val="lt1"/>
+          </a:fontRef>
+        </p:style>
+        <p:txBody>
+          <a:bodyPr rot="0" spcFirstLastPara="0" vertOverflow="overflow" horzOverflow="overflow" vert="horz" wrap="square" lIns="91440" tIns="45720" rIns="91440" bIns="45720" numCol="1" spcCol="0" rtlCol="0" fromWordArt="0" anchor="ctr" anchorCtr="0" forceAA="0" compatLnSpc="1">
+            <a:prstTxWarp prst="textNoShape">
+              <a:avLst/>
+            </a:prstTxWarp>
+            <a:noAutofit/>
+          </a:bodyPr>
+          <a:lstStyle/>
+          <a:p>
+            <a:pPr algn="ctr"/>
+            <a:r>
+              <a:rPr lang="en-US" dirty="0"/>
+              <a:t>Leaf Node. Balance: 50 ETH</a:t>
+            </a:r>
+          </a:p>
+        </p:txBody>
+      </p:sp>
+      <p:cxnSp>
+        <p:nvCxnSpPr>
+          <p:cNvPr id="13" name="Straight Arrow Connector 12"/>
+          <p:cNvCxnSpPr/>
+          <p:nvPr/>
+        </p:nvCxnSpPr>
+        <p:spPr>
+          <a:xfrm flipH="1">
+            <a:off x="3634946" y="1044112"/>
+            <a:ext cx="2353379" cy="608853"/>
+          </a:xfrm>
+          <a:prstGeom prst="straightConnector1">
+            <a:avLst/>
+          </a:prstGeom>
+          <a:ln w="47625">
+            <a:tailEnd type="triangle"/>
+          </a:ln>
+        </p:spPr>
+        <p:style>
+          <a:lnRef idx="1">
+            <a:schemeClr val="accent1"/>
+          </a:lnRef>
+          <a:fillRef idx="0">
+            <a:schemeClr val="accent1"/>
+          </a:fillRef>
+          <a:effectRef idx="0">
+            <a:schemeClr val="accent1"/>
+          </a:effectRef>
+          <a:fontRef idx="minor">
+            <a:schemeClr val="tx1"/>
+          </a:fontRef>
+        </p:style>
+      </p:cxnSp>
+      <p:cxnSp>
+        <p:nvCxnSpPr>
+          <p:cNvPr id="14" name="Straight Arrow Connector 13"/>
+          <p:cNvCxnSpPr/>
+          <p:nvPr/>
+        </p:nvCxnSpPr>
+        <p:spPr>
+          <a:xfrm>
+            <a:off x="5982784" y="1043514"/>
+            <a:ext cx="2350008" cy="608853"/>
+          </a:xfrm>
+          <a:prstGeom prst="straightConnector1">
+            <a:avLst/>
+          </a:prstGeom>
+          <a:ln w="47625">
+            <a:tailEnd type="triangle"/>
+          </a:ln>
+        </p:spPr>
+        <p:style>
+          <a:lnRef idx="1">
+            <a:schemeClr val="accent1"/>
+          </a:lnRef>
+          <a:fillRef idx="0">
+            <a:schemeClr val="accent1"/>
+          </a:fillRef>
+          <a:effectRef idx="0">
+            <a:schemeClr val="accent1"/>
+          </a:effectRef>
+          <a:fontRef idx="minor">
+            <a:schemeClr val="tx1"/>
+          </a:fontRef>
+        </p:style>
+      </p:cxnSp>
+      <p:cxnSp>
+        <p:nvCxnSpPr>
+          <p:cNvPr id="15" name="Straight Arrow Connector 14"/>
+          <p:cNvCxnSpPr/>
+          <p:nvPr/>
+        </p:nvCxnSpPr>
+        <p:spPr>
+          <a:xfrm flipH="1">
+            <a:off x="1541452" y="2381347"/>
+            <a:ext cx="1968367" cy="608256"/>
+          </a:xfrm>
+          <a:prstGeom prst="straightConnector1">
+            <a:avLst/>
+          </a:prstGeom>
+          <a:ln w="47625">
+            <a:tailEnd type="triangle"/>
+          </a:ln>
+        </p:spPr>
+        <p:style>
+          <a:lnRef idx="1">
+            <a:schemeClr val="accent1"/>
+          </a:lnRef>
+          <a:fillRef idx="0">
+            <a:schemeClr val="accent1"/>
+          </a:fillRef>
+          <a:effectRef idx="0">
+            <a:schemeClr val="accent1"/>
+          </a:effectRef>
+          <a:fontRef idx="minor">
+            <a:schemeClr val="tx1"/>
+          </a:fontRef>
+        </p:style>
+      </p:cxnSp>
+      <p:cxnSp>
+        <p:nvCxnSpPr>
+          <p:cNvPr id="18" name="Straight Arrow Connector 17"/>
+          <p:cNvCxnSpPr/>
+          <p:nvPr/>
+        </p:nvCxnSpPr>
+        <p:spPr>
+          <a:xfrm flipH="1">
+            <a:off x="7470608" y="2380749"/>
+            <a:ext cx="996214" cy="608854"/>
+          </a:xfrm>
+          <a:prstGeom prst="straightConnector1">
+            <a:avLst/>
+          </a:prstGeom>
+          <a:ln w="47625">
+            <a:tailEnd type="triangle"/>
+          </a:ln>
+        </p:spPr>
+        <p:style>
+          <a:lnRef idx="1">
+            <a:schemeClr val="accent1"/>
+          </a:lnRef>
+          <a:fillRef idx="0">
+            <a:schemeClr val="accent1"/>
+          </a:fillRef>
+          <a:effectRef idx="0">
+            <a:schemeClr val="accent1"/>
+          </a:effectRef>
+          <a:fontRef idx="minor">
+            <a:schemeClr val="tx1"/>
+          </a:fontRef>
+        </p:style>
+      </p:cxnSp>
+      <p:cxnSp>
+        <p:nvCxnSpPr>
+          <p:cNvPr id="21" name="Straight Arrow Connector 20"/>
+          <p:cNvCxnSpPr/>
+          <p:nvPr/>
+        </p:nvCxnSpPr>
+        <p:spPr>
+          <a:xfrm>
+            <a:off x="3497781" y="2380749"/>
+            <a:ext cx="996214" cy="608854"/>
+          </a:xfrm>
+          <a:prstGeom prst="straightConnector1">
+            <a:avLst/>
+          </a:prstGeom>
+          <a:ln w="47625">
+            <a:tailEnd type="triangle"/>
+          </a:ln>
+        </p:spPr>
+        <p:style>
+          <a:lnRef idx="1">
+            <a:schemeClr val="accent1"/>
+          </a:lnRef>
+          <a:fillRef idx="0">
+            <a:schemeClr val="accent1"/>
+          </a:fillRef>
+          <a:effectRef idx="0">
+            <a:schemeClr val="accent1"/>
+          </a:effectRef>
+          <a:fontRef idx="minor">
+            <a:schemeClr val="tx1"/>
+          </a:fontRef>
+        </p:style>
+      </p:cxnSp>
+      <p:cxnSp>
+        <p:nvCxnSpPr>
+          <p:cNvPr id="22" name="Straight Arrow Connector 21"/>
+          <p:cNvCxnSpPr/>
+          <p:nvPr/>
+        </p:nvCxnSpPr>
+        <p:spPr>
+          <a:xfrm>
+            <a:off x="8478861" y="2380749"/>
+            <a:ext cx="1968367" cy="608256"/>
+          </a:xfrm>
+          <a:prstGeom prst="straightConnector1">
+            <a:avLst/>
+          </a:prstGeom>
+          <a:ln w="47625">
+            <a:tailEnd type="triangle"/>
+          </a:ln>
+        </p:spPr>
+        <p:style>
+          <a:lnRef idx="1">
+            <a:schemeClr val="accent1"/>
+          </a:lnRef>
+          <a:fillRef idx="0">
+            <a:schemeClr val="accent1"/>
+          </a:fillRef>
+          <a:effectRef idx="0">
+            <a:schemeClr val="accent1"/>
+          </a:effectRef>
+          <a:fontRef idx="minor">
+            <a:schemeClr val="tx1"/>
+          </a:fontRef>
+        </p:style>
+      </p:cxnSp>
+      <mc:AlternateContent xmlns:mc="http://schemas.openxmlformats.org/markup-compatibility/2006">
+        <mc:Choice xmlns:a14="http://schemas.microsoft.com/office/drawing/2010/main" Requires="a14">
+          <p:sp>
+            <p:nvSpPr>
+              <p:cNvPr id="2" name="TextBox 1">
+                <a:extLst>
+                  <a:ext uri="{FF2B5EF4-FFF2-40B4-BE49-F238E27FC236}">
+                    <a16:creationId xmlns:a16="http://schemas.microsoft.com/office/drawing/2014/main" id="{BC2244AD-6956-1247-9C7F-E6153BE166F3}"/>
+                  </a:ext>
+                </a:extLst>
+              </p:cNvPr>
+              <p:cNvSpPr txBox="1"/>
+              <p:nvPr/>
+            </p:nvSpPr>
+            <p:spPr>
+              <a:xfrm>
+                <a:off x="3509811" y="326273"/>
+                <a:ext cx="360987" cy="353943"/>
+              </a:xfrm>
+              <a:prstGeom prst="rect">
+                <a:avLst/>
+              </a:prstGeom>
+              <a:noFill/>
+            </p:spPr>
+            <p:txBody>
+              <a:bodyPr wrap="square" rtlCol="0">
+                <a:spAutoFit/>
+              </a:bodyPr>
+              <a:lstStyle/>
+              <a:p>
+                <a14:m>
+                  <m:oMathPara xmlns:m="http://schemas.openxmlformats.org/officeDocument/2006/math">
+                    <m:oMathParaPr>
+                      <m:jc m:val="centerGroup"/>
+                    </m:oMathParaPr>
+                    <m:oMath xmlns:m="http://schemas.openxmlformats.org/officeDocument/2006/math">
+                      <m:sSub>
+                        <m:sSubPr>
+                          <m:ctrlPr>
+                            <a:rPr lang="en-US" b="0" i="1" smtClean="0">
+                              <a:solidFill>
+                                <a:schemeClr val="bg1"/>
+                              </a:solidFill>
+                              <a:latin typeface="Cambria Math" panose="02040503050406030204" pitchFamily="18" charset="0"/>
+                            </a:rPr>
+                          </m:ctrlPr>
+                        </m:sSubPr>
+                        <m:e>
+                          <m:r>
+                            <a:rPr lang="en-US" b="0" i="1" smtClean="0">
+                              <a:solidFill>
+                                <a:schemeClr val="bg1"/>
+                              </a:solidFill>
+                              <a:latin typeface="Cambria Math" panose="02040503050406030204" pitchFamily="18" charset="0"/>
+                            </a:rPr>
+                            <m:t>𝑁</m:t>
+                          </m:r>
+                        </m:e>
+                        <m:sub>
+                          <m:r>
+                            <a:rPr lang="en-US" b="0" i="1" smtClean="0">
+                              <a:solidFill>
+                                <a:schemeClr val="bg1"/>
+                              </a:solidFill>
+                              <a:latin typeface="Cambria Math" panose="02040503050406030204" pitchFamily="18" charset="0"/>
+                            </a:rPr>
+                            <m:t>1</m:t>
+                          </m:r>
+                        </m:sub>
+                      </m:sSub>
+                    </m:oMath>
+                  </m:oMathPara>
+                </a14:m>
+                <a:endParaRPr lang="en-US" dirty="0">
+                  <a:solidFill>
+                    <a:schemeClr val="bg1"/>
+                  </a:solidFill>
+                </a:endParaRPr>
+              </a:p>
+            </p:txBody>
+          </p:sp>
+        </mc:Choice>
+        <mc:Fallback>
+          <p:sp>
+            <p:nvSpPr>
+              <p:cNvPr id="2" name="TextBox 1">
+                <a:extLst>
+                  <a:ext uri="{FF2B5EF4-FFF2-40B4-BE49-F238E27FC236}">
+                    <a16:creationId xmlns:a16="http://schemas.microsoft.com/office/drawing/2014/main" id="{BC2244AD-6956-1247-9C7F-E6153BE166F3}"/>
+                  </a:ext>
+                </a:extLst>
+              </p:cNvPr>
+              <p:cNvSpPr txBox="1">
+                <a:spLocks noRot="1" noChangeAspect="1" noMove="1" noResize="1" noEditPoints="1" noAdjustHandles="1" noChangeArrowheads="1" noChangeShapeType="1" noTextEdit="1"/>
+              </p:cNvSpPr>
+              <p:nvPr/>
+            </p:nvSpPr>
+            <p:spPr>
+              <a:xfrm>
+                <a:off x="3509811" y="326273"/>
+                <a:ext cx="360987" cy="353943"/>
+              </a:xfrm>
+              <a:prstGeom prst="rect">
+                <a:avLst/>
+              </a:prstGeom>
+              <a:blipFill>
+                <a:blip r:embed="rId2"/>
+                <a:stretch>
+                  <a:fillRect/>
+                </a:stretch>
+              </a:blipFill>
+            </p:spPr>
+            <p:txBody>
+              <a:bodyPr/>
+              <a:lstStyle/>
+              <a:p>
+                <a:r>
+                  <a:rPr lang="en-US">
+                    <a:noFill/>
+                  </a:rPr>
+                  <a:t> </a:t>
+                </a:r>
+              </a:p>
+            </p:txBody>
+          </p:sp>
+        </mc:Fallback>
+      </mc:AlternateContent>
+      <mc:AlternateContent xmlns:mc="http://schemas.openxmlformats.org/markup-compatibility/2006">
+        <mc:Choice xmlns:a14="http://schemas.microsoft.com/office/drawing/2010/main" Requires="a14">
+          <p:sp>
+            <p:nvSpPr>
+              <p:cNvPr id="16" name="TextBox 15">
+                <a:extLst>
+                  <a:ext uri="{FF2B5EF4-FFF2-40B4-BE49-F238E27FC236}">
+                    <a16:creationId xmlns:a16="http://schemas.microsoft.com/office/drawing/2014/main" id="{5E08711E-7A14-5C40-8069-F926AB414BA6}"/>
+                  </a:ext>
+                </a:extLst>
+              </p:cNvPr>
+              <p:cNvSpPr txBox="1"/>
+              <p:nvPr/>
+            </p:nvSpPr>
+            <p:spPr>
+              <a:xfrm>
+                <a:off x="1820577" y="1652367"/>
+                <a:ext cx="360987" cy="353943"/>
+              </a:xfrm>
+              <a:prstGeom prst="rect">
+                <a:avLst/>
+              </a:prstGeom>
+              <a:noFill/>
+            </p:spPr>
+            <p:txBody>
+              <a:bodyPr wrap="square" rtlCol="0">
+                <a:spAutoFit/>
+              </a:bodyPr>
+              <a:lstStyle/>
+              <a:p>
+                <a14:m>
+                  <m:oMathPara xmlns:m="http://schemas.openxmlformats.org/officeDocument/2006/math">
+                    <m:oMathParaPr>
+                      <m:jc m:val="centerGroup"/>
+                    </m:oMathParaPr>
+                    <m:oMath xmlns:m="http://schemas.openxmlformats.org/officeDocument/2006/math">
+                      <m:sSub>
+                        <m:sSubPr>
+                          <m:ctrlPr>
+                            <a:rPr lang="en-US" b="0" i="1" smtClean="0">
+                              <a:solidFill>
+                                <a:schemeClr val="bg1"/>
+                              </a:solidFill>
+                              <a:latin typeface="Cambria Math" panose="02040503050406030204" pitchFamily="18" charset="0"/>
+                            </a:rPr>
+                          </m:ctrlPr>
+                        </m:sSubPr>
+                        <m:e>
+                          <m:r>
+                            <a:rPr lang="en-US" b="0" i="1" smtClean="0">
+                              <a:solidFill>
+                                <a:schemeClr val="bg1"/>
+                              </a:solidFill>
+                              <a:latin typeface="Cambria Math" panose="02040503050406030204" pitchFamily="18" charset="0"/>
+                            </a:rPr>
+                            <m:t>𝑁</m:t>
+                          </m:r>
+                        </m:e>
+                        <m:sub>
+                          <m:r>
+                            <a:rPr lang="en-US" b="0" i="1" smtClean="0">
+                              <a:solidFill>
+                                <a:schemeClr val="bg1"/>
+                              </a:solidFill>
+                              <a:latin typeface="Cambria Math" panose="02040503050406030204" pitchFamily="18" charset="0"/>
+                            </a:rPr>
+                            <m:t>2</m:t>
+                          </m:r>
+                        </m:sub>
+                      </m:sSub>
+                    </m:oMath>
+                  </m:oMathPara>
+                </a14:m>
+                <a:endParaRPr lang="en-US" dirty="0">
+                  <a:solidFill>
+                    <a:schemeClr val="bg1"/>
+                  </a:solidFill>
+                </a:endParaRPr>
+              </a:p>
+            </p:txBody>
+          </p:sp>
+        </mc:Choice>
+        <mc:Fallback>
+          <p:sp>
+            <p:nvSpPr>
+              <p:cNvPr id="16" name="TextBox 15">
+                <a:extLst>
+                  <a:ext uri="{FF2B5EF4-FFF2-40B4-BE49-F238E27FC236}">
+                    <a16:creationId xmlns:a16="http://schemas.microsoft.com/office/drawing/2014/main" id="{5E08711E-7A14-5C40-8069-F926AB414BA6}"/>
+                  </a:ext>
+                </a:extLst>
+              </p:cNvPr>
+              <p:cNvSpPr txBox="1">
+                <a:spLocks noRot="1" noChangeAspect="1" noMove="1" noResize="1" noEditPoints="1" noAdjustHandles="1" noChangeArrowheads="1" noChangeShapeType="1" noTextEdit="1"/>
+              </p:cNvSpPr>
+              <p:nvPr/>
+            </p:nvSpPr>
+            <p:spPr>
+              <a:xfrm>
+                <a:off x="1820577" y="1652367"/>
+                <a:ext cx="360987" cy="353943"/>
+              </a:xfrm>
+              <a:prstGeom prst="rect">
+                <a:avLst/>
+              </a:prstGeom>
+              <a:blipFill>
+                <a:blip r:embed="rId3"/>
+                <a:stretch>
+                  <a:fillRect/>
+                </a:stretch>
+              </a:blipFill>
+            </p:spPr>
+            <p:txBody>
+              <a:bodyPr/>
+              <a:lstStyle/>
+              <a:p>
+                <a:r>
+                  <a:rPr lang="en-US">
+                    <a:noFill/>
+                  </a:rPr>
+                  <a:t> </a:t>
+                </a:r>
+              </a:p>
+            </p:txBody>
+          </p:sp>
+        </mc:Fallback>
+      </mc:AlternateContent>
+      <mc:AlternateContent xmlns:mc="http://schemas.openxmlformats.org/markup-compatibility/2006">
+        <mc:Choice xmlns:a14="http://schemas.microsoft.com/office/drawing/2010/main" Requires="a14">
+          <p:sp>
+            <p:nvSpPr>
+              <p:cNvPr id="17" name="TextBox 16">
+                <a:extLst>
+                  <a:ext uri="{FF2B5EF4-FFF2-40B4-BE49-F238E27FC236}">
+                    <a16:creationId xmlns:a16="http://schemas.microsoft.com/office/drawing/2014/main" id="{2E6C53C7-3402-C14B-861D-69A5F433B93F}"/>
+                  </a:ext>
+                </a:extLst>
+              </p:cNvPr>
+              <p:cNvSpPr txBox="1"/>
+              <p:nvPr/>
+            </p:nvSpPr>
+            <p:spPr>
+              <a:xfrm>
+                <a:off x="6772064" y="1652366"/>
+                <a:ext cx="360987" cy="353943"/>
+              </a:xfrm>
+              <a:prstGeom prst="rect">
+                <a:avLst/>
+              </a:prstGeom>
+              <a:noFill/>
+            </p:spPr>
+            <p:txBody>
+              <a:bodyPr wrap="square" rtlCol="0">
+                <a:spAutoFit/>
+              </a:bodyPr>
+              <a:lstStyle/>
+              <a:p>
+                <a14:m>
+                  <m:oMathPara xmlns:m="http://schemas.openxmlformats.org/officeDocument/2006/math">
+                    <m:oMathParaPr>
+                      <m:jc m:val="centerGroup"/>
+                    </m:oMathParaPr>
+                    <m:oMath xmlns:m="http://schemas.openxmlformats.org/officeDocument/2006/math">
+                      <m:sSub>
+                        <m:sSubPr>
+                          <m:ctrlPr>
+                            <a:rPr lang="en-US" b="0" i="1" smtClean="0">
+                              <a:solidFill>
+                                <a:schemeClr val="bg1"/>
+                              </a:solidFill>
+                              <a:latin typeface="Cambria Math" panose="02040503050406030204" pitchFamily="18" charset="0"/>
+                            </a:rPr>
+                          </m:ctrlPr>
+                        </m:sSubPr>
+                        <m:e>
+                          <m:r>
+                            <a:rPr lang="en-US" b="0" i="1" smtClean="0">
+                              <a:solidFill>
+                                <a:schemeClr val="bg1"/>
+                              </a:solidFill>
+                              <a:latin typeface="Cambria Math" panose="02040503050406030204" pitchFamily="18" charset="0"/>
+                            </a:rPr>
+                            <m:t>𝑁</m:t>
+                          </m:r>
+                        </m:e>
+                        <m:sub>
+                          <m:r>
+                            <a:rPr lang="en-US" b="0" i="1" smtClean="0">
+                              <a:solidFill>
+                                <a:schemeClr val="bg1"/>
+                              </a:solidFill>
+                              <a:latin typeface="Cambria Math" panose="02040503050406030204" pitchFamily="18" charset="0"/>
+                            </a:rPr>
+                            <m:t>3</m:t>
+                          </m:r>
+                        </m:sub>
+                      </m:sSub>
+                    </m:oMath>
+                  </m:oMathPara>
+                </a14:m>
+                <a:endParaRPr lang="en-US" dirty="0">
+                  <a:solidFill>
+                    <a:schemeClr val="bg1"/>
+                  </a:solidFill>
+                </a:endParaRPr>
+              </a:p>
+            </p:txBody>
+          </p:sp>
+        </mc:Choice>
+        <mc:Fallback>
+          <p:sp>
+            <p:nvSpPr>
+              <p:cNvPr id="17" name="TextBox 16">
+                <a:extLst>
+                  <a:ext uri="{FF2B5EF4-FFF2-40B4-BE49-F238E27FC236}">
+                    <a16:creationId xmlns:a16="http://schemas.microsoft.com/office/drawing/2014/main" id="{2E6C53C7-3402-C14B-861D-69A5F433B93F}"/>
+                  </a:ext>
+                </a:extLst>
+              </p:cNvPr>
+              <p:cNvSpPr txBox="1">
+                <a:spLocks noRot="1" noChangeAspect="1" noMove="1" noResize="1" noEditPoints="1" noAdjustHandles="1" noChangeArrowheads="1" noChangeShapeType="1" noTextEdit="1"/>
+              </p:cNvSpPr>
+              <p:nvPr/>
+            </p:nvSpPr>
+            <p:spPr>
+              <a:xfrm>
+                <a:off x="6772064" y="1652366"/>
+                <a:ext cx="360987" cy="353943"/>
+              </a:xfrm>
+              <a:prstGeom prst="rect">
+                <a:avLst/>
+              </a:prstGeom>
+              <a:blipFill>
+                <a:blip r:embed="rId4"/>
+                <a:stretch>
+                  <a:fillRect r="-3333"/>
+                </a:stretch>
+              </a:blipFill>
+            </p:spPr>
+            <p:txBody>
+              <a:bodyPr/>
+              <a:lstStyle/>
+              <a:p>
+                <a:r>
+                  <a:rPr lang="en-US">
+                    <a:noFill/>
+                  </a:rPr>
+                  <a:t> </a:t>
+                </a:r>
+              </a:p>
+            </p:txBody>
+          </p:sp>
+        </mc:Fallback>
+      </mc:AlternateContent>
+      <mc:AlternateContent xmlns:mc="http://schemas.openxmlformats.org/markup-compatibility/2006">
+        <mc:Choice xmlns:a14="http://schemas.microsoft.com/office/drawing/2010/main" Requires="a14">
+          <p:sp>
+            <p:nvSpPr>
+              <p:cNvPr id="19" name="TextBox 18">
+                <a:extLst>
+                  <a:ext uri="{FF2B5EF4-FFF2-40B4-BE49-F238E27FC236}">
+                    <a16:creationId xmlns:a16="http://schemas.microsoft.com/office/drawing/2014/main" id="{0A8BB372-4EFF-3C41-846D-3EEBE5FCA62F}"/>
+                  </a:ext>
+                </a:extLst>
+              </p:cNvPr>
+              <p:cNvSpPr txBox="1"/>
+              <p:nvPr/>
+            </p:nvSpPr>
+            <p:spPr>
+              <a:xfrm>
+                <a:off x="545235" y="3215986"/>
+                <a:ext cx="360987" cy="353943"/>
+              </a:xfrm>
+              <a:prstGeom prst="rect">
+                <a:avLst/>
+              </a:prstGeom>
+              <a:noFill/>
+            </p:spPr>
+            <p:txBody>
+              <a:bodyPr wrap="square" rtlCol="0">
+                <a:spAutoFit/>
+              </a:bodyPr>
+              <a:lstStyle/>
+              <a:p>
+                <a14:m>
+                  <m:oMathPara xmlns:m="http://schemas.openxmlformats.org/officeDocument/2006/math">
+                    <m:oMathParaPr>
+                      <m:jc m:val="centerGroup"/>
+                    </m:oMathParaPr>
+                    <m:oMath xmlns:m="http://schemas.openxmlformats.org/officeDocument/2006/math">
+                      <m:sSub>
+                        <m:sSubPr>
+                          <m:ctrlPr>
+                            <a:rPr lang="en-US" b="0" i="1" smtClean="0">
+                              <a:solidFill>
+                                <a:schemeClr val="bg1"/>
+                              </a:solidFill>
+                              <a:latin typeface="Cambria Math" panose="02040503050406030204" pitchFamily="18" charset="0"/>
+                            </a:rPr>
+                          </m:ctrlPr>
+                        </m:sSubPr>
+                        <m:e>
+                          <m:r>
+                            <a:rPr lang="en-US" b="0" i="1" smtClean="0">
+                              <a:solidFill>
+                                <a:schemeClr val="bg1"/>
+                              </a:solidFill>
+                              <a:latin typeface="Cambria Math" panose="02040503050406030204" pitchFamily="18" charset="0"/>
+                            </a:rPr>
+                            <m:t>𝑁</m:t>
+                          </m:r>
+                        </m:e>
+                        <m:sub>
+                          <m:r>
+                            <a:rPr lang="en-US" b="0" i="1" smtClean="0">
+                              <a:solidFill>
+                                <a:schemeClr val="bg1"/>
+                              </a:solidFill>
+                              <a:latin typeface="Cambria Math" panose="02040503050406030204" pitchFamily="18" charset="0"/>
+                            </a:rPr>
+                            <m:t>4</m:t>
+                          </m:r>
+                        </m:sub>
+                      </m:sSub>
+                    </m:oMath>
+                  </m:oMathPara>
+                </a14:m>
+                <a:endParaRPr lang="en-US" dirty="0">
+                  <a:solidFill>
+                    <a:schemeClr val="bg1"/>
+                  </a:solidFill>
+                </a:endParaRPr>
+              </a:p>
+            </p:txBody>
+          </p:sp>
+        </mc:Choice>
+        <mc:Fallback>
+          <p:sp>
+            <p:nvSpPr>
+              <p:cNvPr id="19" name="TextBox 18">
+                <a:extLst>
+                  <a:ext uri="{FF2B5EF4-FFF2-40B4-BE49-F238E27FC236}">
+                    <a16:creationId xmlns:a16="http://schemas.microsoft.com/office/drawing/2014/main" id="{0A8BB372-4EFF-3C41-846D-3EEBE5FCA62F}"/>
+                  </a:ext>
+                </a:extLst>
+              </p:cNvPr>
+              <p:cNvSpPr txBox="1">
+                <a:spLocks noRot="1" noChangeAspect="1" noMove="1" noResize="1" noEditPoints="1" noAdjustHandles="1" noChangeArrowheads="1" noChangeShapeType="1" noTextEdit="1"/>
+              </p:cNvSpPr>
+              <p:nvPr/>
+            </p:nvSpPr>
+            <p:spPr>
+              <a:xfrm>
+                <a:off x="545235" y="3215986"/>
+                <a:ext cx="360987" cy="353943"/>
+              </a:xfrm>
+              <a:prstGeom prst="rect">
+                <a:avLst/>
+              </a:prstGeom>
+              <a:blipFill>
+                <a:blip r:embed="rId5"/>
+                <a:stretch>
+                  <a:fillRect r="-3448"/>
+                </a:stretch>
+              </a:blipFill>
+            </p:spPr>
+            <p:txBody>
+              <a:bodyPr/>
+              <a:lstStyle/>
+              <a:p>
+                <a:r>
+                  <a:rPr lang="en-US">
+                    <a:noFill/>
+                  </a:rPr>
+                  <a:t> </a:t>
+                </a:r>
+              </a:p>
+            </p:txBody>
+          </p:sp>
+        </mc:Fallback>
+      </mc:AlternateContent>
+      <mc:AlternateContent xmlns:mc="http://schemas.openxmlformats.org/markup-compatibility/2006">
+        <mc:Choice xmlns:a14="http://schemas.microsoft.com/office/drawing/2010/main" Requires="a14">
+          <p:sp>
+            <p:nvSpPr>
+              <p:cNvPr id="20" name="TextBox 19">
+                <a:extLst>
+                  <a:ext uri="{FF2B5EF4-FFF2-40B4-BE49-F238E27FC236}">
+                    <a16:creationId xmlns:a16="http://schemas.microsoft.com/office/drawing/2014/main" id="{151A1E2E-AB67-4A4E-B52E-E1CFA8AC595B}"/>
+                  </a:ext>
+                </a:extLst>
+              </p:cNvPr>
+              <p:cNvSpPr txBox="1"/>
+              <p:nvPr/>
+            </p:nvSpPr>
+            <p:spPr>
+              <a:xfrm>
+                <a:off x="3509810" y="3215986"/>
+                <a:ext cx="360987" cy="353943"/>
+              </a:xfrm>
+              <a:prstGeom prst="rect">
+                <a:avLst/>
+              </a:prstGeom>
+              <a:noFill/>
+            </p:spPr>
+            <p:txBody>
+              <a:bodyPr wrap="square" rtlCol="0">
+                <a:spAutoFit/>
+              </a:bodyPr>
+              <a:lstStyle/>
+              <a:p>
+                <a14:m>
+                  <m:oMathPara xmlns:m="http://schemas.openxmlformats.org/officeDocument/2006/math">
+                    <m:oMathParaPr>
+                      <m:jc m:val="centerGroup"/>
+                    </m:oMathParaPr>
+                    <m:oMath xmlns:m="http://schemas.openxmlformats.org/officeDocument/2006/math">
+                      <m:sSub>
+                        <m:sSubPr>
+                          <m:ctrlPr>
+                            <a:rPr lang="en-US" b="0" i="1" smtClean="0">
+                              <a:solidFill>
+                                <a:schemeClr val="bg1"/>
+                              </a:solidFill>
+                              <a:latin typeface="Cambria Math" panose="02040503050406030204" pitchFamily="18" charset="0"/>
+                            </a:rPr>
+                          </m:ctrlPr>
+                        </m:sSubPr>
+                        <m:e>
+                          <m:r>
+                            <a:rPr lang="en-US" b="0" i="1" smtClean="0">
+                              <a:solidFill>
+                                <a:schemeClr val="bg1"/>
+                              </a:solidFill>
+                              <a:latin typeface="Cambria Math" panose="02040503050406030204" pitchFamily="18" charset="0"/>
+                            </a:rPr>
+                            <m:t>𝑁</m:t>
+                          </m:r>
+                        </m:e>
+                        <m:sub>
+                          <m:r>
+                            <a:rPr lang="en-US" b="0" i="1" smtClean="0">
+                              <a:solidFill>
+                                <a:schemeClr val="bg1"/>
+                              </a:solidFill>
+                              <a:latin typeface="Cambria Math" panose="02040503050406030204" pitchFamily="18" charset="0"/>
+                            </a:rPr>
+                            <m:t>5</m:t>
+                          </m:r>
+                        </m:sub>
+                      </m:sSub>
+                    </m:oMath>
+                  </m:oMathPara>
+                </a14:m>
+                <a:endParaRPr lang="en-US" dirty="0">
+                  <a:solidFill>
+                    <a:schemeClr val="bg1"/>
+                  </a:solidFill>
+                </a:endParaRPr>
+              </a:p>
+            </p:txBody>
+          </p:sp>
+        </mc:Choice>
+        <mc:Fallback>
+          <p:sp>
+            <p:nvSpPr>
+              <p:cNvPr id="20" name="TextBox 19">
+                <a:extLst>
+                  <a:ext uri="{FF2B5EF4-FFF2-40B4-BE49-F238E27FC236}">
+                    <a16:creationId xmlns:a16="http://schemas.microsoft.com/office/drawing/2014/main" id="{151A1E2E-AB67-4A4E-B52E-E1CFA8AC595B}"/>
+                  </a:ext>
+                </a:extLst>
+              </p:cNvPr>
+              <p:cNvSpPr txBox="1">
+                <a:spLocks noRot="1" noChangeAspect="1" noMove="1" noResize="1" noEditPoints="1" noAdjustHandles="1" noChangeArrowheads="1" noChangeShapeType="1" noTextEdit="1"/>
+              </p:cNvSpPr>
+              <p:nvPr/>
+            </p:nvSpPr>
+            <p:spPr>
+              <a:xfrm>
+                <a:off x="3509810" y="3215986"/>
+                <a:ext cx="360987" cy="353943"/>
+              </a:xfrm>
+              <a:prstGeom prst="rect">
+                <a:avLst/>
+              </a:prstGeom>
+              <a:blipFill>
+                <a:blip r:embed="rId6"/>
+                <a:stretch>
+                  <a:fillRect r="-3448"/>
+                </a:stretch>
+              </a:blipFill>
+            </p:spPr>
+            <p:txBody>
+              <a:bodyPr/>
+              <a:lstStyle/>
+              <a:p>
+                <a:r>
+                  <a:rPr lang="en-US">
+                    <a:noFill/>
+                  </a:rPr>
+                  <a:t> </a:t>
+                </a:r>
+              </a:p>
+            </p:txBody>
+          </p:sp>
+        </mc:Fallback>
+      </mc:AlternateContent>
+      <mc:AlternateContent xmlns:mc="http://schemas.openxmlformats.org/markup-compatibility/2006">
+        <mc:Choice xmlns:a14="http://schemas.microsoft.com/office/drawing/2010/main" Requires="a14">
+          <p:sp>
+            <p:nvSpPr>
+              <p:cNvPr id="23" name="TextBox 22">
+                <a:extLst>
+                  <a:ext uri="{FF2B5EF4-FFF2-40B4-BE49-F238E27FC236}">
+                    <a16:creationId xmlns:a16="http://schemas.microsoft.com/office/drawing/2014/main" id="{BFE4FA42-E4C2-9A4F-9D99-71C29D20A8A8}"/>
+                  </a:ext>
+                </a:extLst>
+              </p:cNvPr>
+              <p:cNvSpPr txBox="1"/>
+              <p:nvPr/>
+            </p:nvSpPr>
+            <p:spPr>
+              <a:xfrm>
+                <a:off x="6474401" y="3215985"/>
+                <a:ext cx="360987" cy="353943"/>
+              </a:xfrm>
+              <a:prstGeom prst="rect">
+                <a:avLst/>
+              </a:prstGeom>
+              <a:noFill/>
+            </p:spPr>
+            <p:txBody>
+              <a:bodyPr wrap="square" rtlCol="0">
+                <a:spAutoFit/>
+              </a:bodyPr>
+              <a:lstStyle/>
+              <a:p>
+                <a14:m>
+                  <m:oMathPara xmlns:m="http://schemas.openxmlformats.org/officeDocument/2006/math">
+                    <m:oMathParaPr>
+                      <m:jc m:val="centerGroup"/>
+                    </m:oMathParaPr>
+                    <m:oMath xmlns:m="http://schemas.openxmlformats.org/officeDocument/2006/math">
+                      <m:sSub>
+                        <m:sSubPr>
+                          <m:ctrlPr>
+                            <a:rPr lang="en-US" b="0" i="1" smtClean="0">
+                              <a:solidFill>
+                                <a:schemeClr val="bg1"/>
+                              </a:solidFill>
+                              <a:latin typeface="Cambria Math" panose="02040503050406030204" pitchFamily="18" charset="0"/>
+                            </a:rPr>
+                          </m:ctrlPr>
+                        </m:sSubPr>
+                        <m:e>
+                          <m:r>
+                            <a:rPr lang="en-US" b="0" i="1" smtClean="0">
+                              <a:solidFill>
+                                <a:schemeClr val="bg1"/>
+                              </a:solidFill>
+                              <a:latin typeface="Cambria Math" panose="02040503050406030204" pitchFamily="18" charset="0"/>
+                            </a:rPr>
+                            <m:t>𝑁</m:t>
+                          </m:r>
+                        </m:e>
+                        <m:sub>
+                          <m:r>
+                            <a:rPr lang="en-US" b="0" i="1" smtClean="0">
+                              <a:solidFill>
+                                <a:schemeClr val="bg1"/>
+                              </a:solidFill>
+                              <a:latin typeface="Cambria Math" panose="02040503050406030204" pitchFamily="18" charset="0"/>
+                            </a:rPr>
+                            <m:t>6</m:t>
+                          </m:r>
+                        </m:sub>
+                      </m:sSub>
+                    </m:oMath>
+                  </m:oMathPara>
+                </a14:m>
+                <a:endParaRPr lang="en-US" dirty="0">
+                  <a:solidFill>
+                    <a:schemeClr val="bg1"/>
+                  </a:solidFill>
+                </a:endParaRPr>
+              </a:p>
+            </p:txBody>
+          </p:sp>
+        </mc:Choice>
+        <mc:Fallback>
+          <p:sp>
+            <p:nvSpPr>
+              <p:cNvPr id="23" name="TextBox 22">
+                <a:extLst>
+                  <a:ext uri="{FF2B5EF4-FFF2-40B4-BE49-F238E27FC236}">
+                    <a16:creationId xmlns:a16="http://schemas.microsoft.com/office/drawing/2014/main" id="{BFE4FA42-E4C2-9A4F-9D99-71C29D20A8A8}"/>
+                  </a:ext>
+                </a:extLst>
+              </p:cNvPr>
+              <p:cNvSpPr txBox="1">
+                <a:spLocks noRot="1" noChangeAspect="1" noMove="1" noResize="1" noEditPoints="1" noAdjustHandles="1" noChangeArrowheads="1" noChangeShapeType="1" noTextEdit="1"/>
+              </p:cNvSpPr>
+              <p:nvPr/>
+            </p:nvSpPr>
+            <p:spPr>
+              <a:xfrm>
+                <a:off x="6474401" y="3215985"/>
+                <a:ext cx="360987" cy="353943"/>
+              </a:xfrm>
+              <a:prstGeom prst="rect">
+                <a:avLst/>
+              </a:prstGeom>
+              <a:blipFill>
+                <a:blip r:embed="rId7"/>
+                <a:stretch>
+                  <a:fillRect r="-3448"/>
+                </a:stretch>
+              </a:blipFill>
+            </p:spPr>
+            <p:txBody>
+              <a:bodyPr/>
+              <a:lstStyle/>
+              <a:p>
+                <a:r>
+                  <a:rPr lang="en-US">
+                    <a:noFill/>
+                  </a:rPr>
+                  <a:t> </a:t>
+                </a:r>
+              </a:p>
+            </p:txBody>
+          </p:sp>
+        </mc:Fallback>
+      </mc:AlternateContent>
+      <mc:AlternateContent xmlns:mc="http://schemas.openxmlformats.org/markup-compatibility/2006">
+        <mc:Choice xmlns:a14="http://schemas.microsoft.com/office/drawing/2010/main" Requires="a14">
+          <p:sp>
+            <p:nvSpPr>
+              <p:cNvPr id="24" name="TextBox 23">
+                <a:extLst>
+                  <a:ext uri="{FF2B5EF4-FFF2-40B4-BE49-F238E27FC236}">
+                    <a16:creationId xmlns:a16="http://schemas.microsoft.com/office/drawing/2014/main" id="{3E39DEE8-01E8-2748-BF64-FA5C816687B4}"/>
+                  </a:ext>
+                </a:extLst>
+              </p:cNvPr>
+              <p:cNvSpPr txBox="1"/>
+              <p:nvPr/>
+            </p:nvSpPr>
+            <p:spPr>
+              <a:xfrm>
+                <a:off x="9438983" y="3201610"/>
+                <a:ext cx="360987" cy="353943"/>
+              </a:xfrm>
+              <a:prstGeom prst="rect">
+                <a:avLst/>
+              </a:prstGeom>
+              <a:noFill/>
+            </p:spPr>
+            <p:txBody>
+              <a:bodyPr wrap="square" rtlCol="0">
+                <a:spAutoFit/>
+              </a:bodyPr>
+              <a:lstStyle/>
+              <a:p>
+                <a14:m>
+                  <m:oMathPara xmlns:m="http://schemas.openxmlformats.org/officeDocument/2006/math">
+                    <m:oMathParaPr>
+                      <m:jc m:val="centerGroup"/>
+                    </m:oMathParaPr>
+                    <m:oMath xmlns:m="http://schemas.openxmlformats.org/officeDocument/2006/math">
+                      <m:sSub>
+                        <m:sSubPr>
+                          <m:ctrlPr>
+                            <a:rPr lang="en-US" b="0" i="1" smtClean="0">
+                              <a:solidFill>
+                                <a:schemeClr val="bg1"/>
+                              </a:solidFill>
+                              <a:latin typeface="Cambria Math" panose="02040503050406030204" pitchFamily="18" charset="0"/>
+                            </a:rPr>
+                          </m:ctrlPr>
+                        </m:sSubPr>
+                        <m:e>
+                          <m:r>
+                            <a:rPr lang="en-US" b="0" i="1" smtClean="0">
+                              <a:solidFill>
+                                <a:schemeClr val="bg1"/>
+                              </a:solidFill>
+                              <a:latin typeface="Cambria Math" panose="02040503050406030204" pitchFamily="18" charset="0"/>
+                            </a:rPr>
+                            <m:t>𝑁</m:t>
+                          </m:r>
+                        </m:e>
+                        <m:sub>
+                          <m:r>
+                            <a:rPr lang="en-US" b="0" i="1" smtClean="0">
+                              <a:solidFill>
+                                <a:schemeClr val="bg1"/>
+                              </a:solidFill>
+                              <a:latin typeface="Cambria Math" panose="02040503050406030204" pitchFamily="18" charset="0"/>
+                            </a:rPr>
+                            <m:t>7</m:t>
+                          </m:r>
+                        </m:sub>
+                      </m:sSub>
+                    </m:oMath>
+                  </m:oMathPara>
+                </a14:m>
+                <a:endParaRPr lang="en-US" dirty="0">
+                  <a:solidFill>
+                    <a:schemeClr val="bg1"/>
+                  </a:solidFill>
+                </a:endParaRPr>
+              </a:p>
+            </p:txBody>
+          </p:sp>
+        </mc:Choice>
+        <mc:Fallback>
+          <p:sp>
+            <p:nvSpPr>
+              <p:cNvPr id="24" name="TextBox 23">
+                <a:extLst>
+                  <a:ext uri="{FF2B5EF4-FFF2-40B4-BE49-F238E27FC236}">
+                    <a16:creationId xmlns:a16="http://schemas.microsoft.com/office/drawing/2014/main" id="{3E39DEE8-01E8-2748-BF64-FA5C816687B4}"/>
+                  </a:ext>
+                </a:extLst>
+              </p:cNvPr>
+              <p:cNvSpPr txBox="1">
+                <a:spLocks noRot="1" noChangeAspect="1" noMove="1" noResize="1" noEditPoints="1" noAdjustHandles="1" noChangeArrowheads="1" noChangeShapeType="1" noTextEdit="1"/>
+              </p:cNvSpPr>
+              <p:nvPr/>
+            </p:nvSpPr>
+            <p:spPr>
+              <a:xfrm>
+                <a:off x="9438983" y="3201610"/>
+                <a:ext cx="360987" cy="353943"/>
+              </a:xfrm>
+              <a:prstGeom prst="rect">
+                <a:avLst/>
+              </a:prstGeom>
+              <a:blipFill>
+                <a:blip r:embed="rId8"/>
+                <a:stretch>
+                  <a:fillRect/>
+                </a:stretch>
+              </a:blipFill>
+            </p:spPr>
+            <p:txBody>
+              <a:bodyPr/>
+              <a:lstStyle/>
+              <a:p>
+                <a:r>
+                  <a:rPr lang="en-US">
+                    <a:noFill/>
+                  </a:rPr>
+                  <a:t> </a:t>
+                </a:r>
+              </a:p>
+            </p:txBody>
+          </p:sp>
+        </mc:Fallback>
+      </mc:AlternateContent>
+    </p:spTree>
+    <p:extLst>
+      <p:ext uri="{BB962C8B-B14F-4D97-AF65-F5344CB8AC3E}">
+        <p14:creationId xmlns:p14="http://schemas.microsoft.com/office/powerpoint/2010/main" val="1469865800"/>
       </p:ext>
     </p:extLst>
   </p:cSld>

</xml_diff>